<commit_message>
update slides with new model
</commit_message>
<xml_diff>
--- a/src/main/resources/hw7_presentation.pptx
+++ b/src/main/resources/hw7_presentation.pptx
@@ -516,31 +516,27 @@
           <a:p>
             <a:r>
               <a:rPr lang="en-US" dirty="0" smtClean="0"/>
-              <a:t>All </a:t>
+              <a:t>Interact strategy example: ghost handles all </a:t>
             </a:r>
             <a:r>
               <a:rPr lang="en-US" dirty="0" err="1" smtClean="0"/>
-              <a:t>AGameObjects</a:t>
+              <a:t>pacman</a:t>
+            </a:r>
+            <a:r>
+              <a:rPr lang="en-US" dirty="0" smtClean="0"/>
+              <a:t>-ghost interactions, and </a:t>
+            </a:r>
+            <a:r>
+              <a:rPr lang="en-US" dirty="0" err="1" smtClean="0"/>
+              <a:t>pacman</a:t>
+            </a:r>
+            <a:r>
+              <a:rPr lang="en-US" dirty="0" smtClean="0"/>
+              <a:t> does not</a:t>
             </a:r>
             <a:r>
               <a:rPr lang="en-US" baseline="0" dirty="0" smtClean="0"/>
-              <a:t> implement Observer Talk </a:t>
-            </a:r>
-            <a:r>
-              <a:rPr lang="en-US" dirty="0" smtClean="0"/>
-              <a:t>about </a:t>
-            </a:r>
-            <a:r>
-              <a:rPr lang="en-US" dirty="0" smtClean="0"/>
-              <a:t>inheritance structure and </a:t>
-            </a:r>
-            <a:r>
-              <a:rPr lang="en-US" dirty="0" smtClean="0"/>
-              <a:t>functions.</a:t>
-            </a:r>
-            <a:r>
-              <a:rPr lang="en-US" baseline="0" dirty="0" smtClean="0"/>
-              <a:t> </a:t>
+              <a:t> worry about it.</a:t>
             </a:r>
             <a:endParaRPr lang="en-US" dirty="0"/>
           </a:p>
@@ -563,7 +559,7 @@
           <a:p>
             <a:fld id="{B0EC7914-C99C-EC47-BACB-EACC7A5FFFA3}" type="slidenum">
               <a:rPr lang="en-US" smtClean="0"/>
-              <a:t>7</a:t>
+              <a:t>6</a:t>
             </a:fld>
             <a:endParaRPr lang="en-US"/>
           </a:p>
@@ -572,7 +568,7 @@
     </p:spTree>
     <p:extLst>
       <p:ext uri="{BB962C8B-B14F-4D97-AF65-F5344CB8AC3E}">
-        <p14:creationId xmlns:p14="http://schemas.microsoft.com/office/powerpoint/2010/main" val="940924563"/>
+        <p14:creationId xmlns:p14="http://schemas.microsoft.com/office/powerpoint/2010/main" val="2346791306"/>
       </p:ext>
     </p:extLst>
   </p:cSld>
@@ -628,7 +624,37 @@
           <a:p>
             <a:r>
               <a:rPr lang="en-US" dirty="0" smtClean="0"/>
-              <a:t>Talk about timers and values</a:t>
+              <a:t>All </a:t>
+            </a:r>
+            <a:r>
+              <a:rPr lang="en-US" dirty="0" err="1" smtClean="0"/>
+              <a:t>AGameObjects</a:t>
+            </a:r>
+            <a:r>
+              <a:rPr lang="en-US" baseline="0" dirty="0" smtClean="0"/>
+              <a:t> implement </a:t>
+            </a:r>
+            <a:r>
+              <a:rPr lang="en-US" baseline="0" dirty="0" smtClean="0"/>
+              <a:t>Observer. </a:t>
+            </a:r>
+            <a:r>
+              <a:rPr lang="en-US" baseline="0" dirty="0" smtClean="0"/>
+              <a:t>Talk </a:t>
+            </a:r>
+            <a:r>
+              <a:rPr lang="en-US" dirty="0" smtClean="0"/>
+              <a:t>about inheritance structure and functions</a:t>
+            </a:r>
+            <a:r>
+              <a:rPr lang="en-US" dirty="0" smtClean="0"/>
+              <a:t>.</a:t>
+            </a:r>
+          </a:p>
+          <a:p>
+            <a:r>
+              <a:rPr lang="en-US" baseline="0" dirty="0" smtClean="0"/>
+              <a:t>Separate concrete classes for easy object creation and extensibility. </a:t>
             </a:r>
             <a:endParaRPr lang="en-US" dirty="0"/>
           </a:p>
@@ -651,7 +677,7 @@
           <a:p>
             <a:fld id="{B0EC7914-C99C-EC47-BACB-EACC7A5FFFA3}" type="slidenum">
               <a:rPr lang="en-US" smtClean="0"/>
-              <a:t>8</a:t>
+              <a:t>7</a:t>
             </a:fld>
             <a:endParaRPr lang="en-US"/>
           </a:p>
@@ -660,7 +686,7 @@
     </p:spTree>
     <p:extLst>
       <p:ext uri="{BB962C8B-B14F-4D97-AF65-F5344CB8AC3E}">
-        <p14:creationId xmlns:p14="http://schemas.microsoft.com/office/powerpoint/2010/main" val="2447390117"/>
+        <p14:creationId xmlns:p14="http://schemas.microsoft.com/office/powerpoint/2010/main" val="940924563"/>
       </p:ext>
     </p:extLst>
   </p:cSld>
@@ -716,6 +742,102 @@
           <a:p>
             <a:r>
               <a:rPr lang="en-US" dirty="0" smtClean="0"/>
+              <a:t>Talk about timers and </a:t>
+            </a:r>
+            <a:r>
+              <a:rPr lang="en-US" dirty="0" smtClean="0"/>
+              <a:t>values. Grid</a:t>
+            </a:r>
+            <a:r>
+              <a:rPr lang="en-US" baseline="0" dirty="0" smtClean="0"/>
+              <a:t> size is static for easy access in concrete classes.</a:t>
+            </a:r>
+            <a:endParaRPr lang="en-US" dirty="0"/>
+          </a:p>
+        </p:txBody>
+      </p:sp>
+      <p:sp>
+        <p:nvSpPr>
+          <p:cNvPr id="4" name="Slide Number Placeholder 3"/>
+          <p:cNvSpPr>
+            <a:spLocks noGrp="1"/>
+          </p:cNvSpPr>
+          <p:nvPr>
+            <p:ph type="sldNum" sz="quarter" idx="10"/>
+          </p:nvPr>
+        </p:nvSpPr>
+        <p:spPr/>
+        <p:txBody>
+          <a:bodyPr/>
+          <a:lstStyle/>
+          <a:p>
+            <a:fld id="{B0EC7914-C99C-EC47-BACB-EACC7A5FFFA3}" type="slidenum">
+              <a:rPr lang="en-US" smtClean="0"/>
+              <a:t>8</a:t>
+            </a:fld>
+            <a:endParaRPr lang="en-US"/>
+          </a:p>
+        </p:txBody>
+      </p:sp>
+    </p:spTree>
+    <p:extLst>
+      <p:ext uri="{BB962C8B-B14F-4D97-AF65-F5344CB8AC3E}">
+        <p14:creationId xmlns:p14="http://schemas.microsoft.com/office/powerpoint/2010/main" val="2447390117"/>
+      </p:ext>
+    </p:extLst>
+  </p:cSld>
+  <p:clrMapOvr>
+    <a:masterClrMapping/>
+  </p:clrMapOvr>
+</p:notes>
+</file>
+
+<file path=ppt/notesSlides/notesSlide4.xml><?xml version="1.0" encoding="utf-8"?>
+<p:notes xmlns:a="http://schemas.openxmlformats.org/drawingml/2006/main" xmlns:r="http://schemas.openxmlformats.org/officeDocument/2006/relationships" xmlns:p="http://schemas.openxmlformats.org/presentationml/2006/main">
+  <p:cSld>
+    <p:spTree>
+      <p:nvGrpSpPr>
+        <p:cNvPr id="1" name=""/>
+        <p:cNvGrpSpPr/>
+        <p:nvPr/>
+      </p:nvGrpSpPr>
+      <p:grpSpPr>
+        <a:xfrm>
+          <a:off x="0" y="0"/>
+          <a:ext cx="0" cy="0"/>
+          <a:chOff x="0" y="0"/>
+          <a:chExt cx="0" cy="0"/>
+        </a:xfrm>
+      </p:grpSpPr>
+      <p:sp>
+        <p:nvSpPr>
+          <p:cNvPr id="2" name="Slide Image Placeholder 1"/>
+          <p:cNvSpPr>
+            <a:spLocks noGrp="1" noRot="1" noChangeAspect="1"/>
+          </p:cNvSpPr>
+          <p:nvPr>
+            <p:ph type="sldImg"/>
+          </p:nvPr>
+        </p:nvSpPr>
+        <p:spPr/>
+      </p:sp>
+      <p:sp>
+        <p:nvSpPr>
+          <p:cNvPr id="3" name="Notes Placeholder 2"/>
+          <p:cNvSpPr>
+            <a:spLocks noGrp="1"/>
+          </p:cNvSpPr>
+          <p:nvPr>
+            <p:ph type="body" idx="1"/>
+          </p:nvPr>
+        </p:nvSpPr>
+        <p:spPr/>
+        <p:txBody>
+          <a:bodyPr/>
+          <a:lstStyle/>
+          <a:p>
+            <a:r>
+              <a:rPr lang="en-US" dirty="0" smtClean="0"/>
               <a:t>What each request</a:t>
             </a:r>
             <a:r>
@@ -762,7 +884,7 @@
 </p:notes>
 </file>
 
-<file path=ppt/notesSlides/notesSlide4.xml><?xml version="1.0" encoding="utf-8"?>
+<file path=ppt/notesSlides/notesSlide5.xml><?xml version="1.0" encoding="utf-8"?>
 <p:notes xmlns:a="http://schemas.openxmlformats.org/drawingml/2006/main" xmlns:r="http://schemas.openxmlformats.org/officeDocument/2006/relationships" xmlns:p="http://schemas.openxmlformats.org/presentationml/2006/main">
   <p:cSld>
     <p:spTree>
@@ -4213,8 +4335,9 @@
             <a:pPr lvl="1"/>
             <a:r>
               <a:rPr lang="en-US" dirty="0" smtClean="0"/>
-              <a:t>Randomly spawn fruit</a:t>
-            </a:r>
+              <a:t>Spawn fruit periodically</a:t>
+            </a:r>
+            <a:endParaRPr lang="en-US" dirty="0" smtClean="0"/>
           </a:p>
           <a:p>
             <a:pPr lvl="1"/>
@@ -4227,7 +4350,15 @@
             <a:pPr lvl="1"/>
             <a:r>
               <a:rPr lang="en-US" dirty="0" smtClean="0"/>
-              <a:t>Track score, lives, etc.</a:t>
+              <a:t>Track score, lives, </a:t>
+            </a:r>
+            <a:r>
+              <a:rPr lang="en-US" dirty="0" smtClean="0"/>
+              <a:t>timers, etc</a:t>
+            </a:r>
+            <a:r>
+              <a:rPr lang="en-US" dirty="0" smtClean="0"/>
+              <a:t>.</a:t>
             </a:r>
             <a:endParaRPr lang="en-US" dirty="0"/>
           </a:p>
@@ -4769,7 +4900,11 @@
             </a:r>
             <a:r>
               <a:rPr lang="en-US" dirty="0" smtClean="0"/>
-              <a:t> one-directional interactions</a:t>
+              <a:t> one-directional </a:t>
+            </a:r>
+            <a:r>
+              <a:rPr lang="en-US" dirty="0" smtClean="0"/>
+              <a:t>interactions</a:t>
             </a:r>
           </a:p>
         </p:txBody>
@@ -4848,7 +4983,7 @@
       </p:sp>
       <p:pic>
         <p:nvPicPr>
-          <p:cNvPr id="3" name="Picture 2"/>
+          <p:cNvPr id="4" name="Picture 3"/>
           <p:cNvPicPr>
             <a:picLocks noChangeAspect="1"/>
           </p:cNvPicPr>
@@ -4862,8 +4997,8 @@
         </p:blipFill>
         <p:spPr>
           <a:xfrm>
-            <a:off x="1817244" y="1313022"/>
-            <a:ext cx="5526708" cy="5299182"/>
+            <a:off x="1417067" y="1276342"/>
+            <a:ext cx="6298277" cy="5294097"/>
           </a:xfrm>
           <a:prstGeom prst="rect">
             <a:avLst/>
@@ -4932,7 +5067,7 @@
       </p:sp>
       <p:pic>
         <p:nvPicPr>
-          <p:cNvPr id="3" name="Picture 2"/>
+          <p:cNvPr id="4" name="Picture 3"/>
           <p:cNvPicPr>
             <a:picLocks noChangeAspect="1"/>
           </p:cNvPicPr>
@@ -4946,8 +5081,32 @@
         </p:blipFill>
         <p:spPr>
           <a:xfrm>
-            <a:off x="2656711" y="1417638"/>
-            <a:ext cx="3824655" cy="4938348"/>
+            <a:off x="1001308" y="1417638"/>
+            <a:ext cx="3044246" cy="3135391"/>
+          </a:xfrm>
+          <a:prstGeom prst="rect">
+            <a:avLst/>
+          </a:prstGeom>
+        </p:spPr>
+      </p:pic>
+      <p:pic>
+        <p:nvPicPr>
+          <p:cNvPr id="5" name="Picture 4"/>
+          <p:cNvPicPr>
+            <a:picLocks noChangeAspect="1"/>
+          </p:cNvPicPr>
+          <p:nvPr/>
+        </p:nvPicPr>
+        <p:blipFill>
+          <a:blip r:embed="rId4"/>
+          <a:stretch>
+            <a:fillRect/>
+          </a:stretch>
+        </p:blipFill>
+        <p:spPr>
+          <a:xfrm>
+            <a:off x="4806233" y="1417638"/>
+            <a:ext cx="3136900" cy="4699000"/>
           </a:xfrm>
           <a:prstGeom prst="rect">
             <a:avLst/>
@@ -5050,17 +5209,8 @@
             </a:r>
             <a:r>
               <a:rPr lang="en-US" dirty="0" smtClean="0"/>
-              <a:t> </a:t>
-            </a:r>
-            <a:r>
-              <a:rPr lang="en-US" dirty="0" smtClean="0"/>
-              <a:t>get canvas dims and </a:t>
-            </a:r>
-            <a:r>
-              <a:rPr lang="en-US" dirty="0" smtClean="0"/>
-              <a:t>reset game objects </a:t>
-            </a:r>
-            <a:endParaRPr lang="en-US" dirty="0" smtClean="0"/>
+              <a:t> get canvas dims and reset game objects </a:t>
+            </a:r>
           </a:p>
           <a:p>
             <a:pPr lvl="1"/>
@@ -5080,7 +5230,6 @@
               <a:rPr lang="en-US" dirty="0" smtClean="0"/>
               <a:t> update game object states</a:t>
             </a:r>
-            <a:endParaRPr lang="en-US" dirty="0" smtClean="0"/>
           </a:p>
           <a:p>
             <a:pPr lvl="1"/>
@@ -5102,11 +5251,7 @@
             </a:r>
             <a:r>
               <a:rPr lang="en-US" dirty="0" err="1" smtClean="0"/>
-              <a:t>Pacm</a:t>
-            </a:r>
-            <a:r>
-              <a:rPr lang="en-US" dirty="0" err="1" smtClean="0"/>
-              <a:t>an</a:t>
+              <a:t>Pacman</a:t>
             </a:r>
             <a:r>
               <a:rPr lang="en-US" smtClean="0"/>

</xml_diff>

<commit_message>
add final comments and design decisions
</commit_message>
<xml_diff>
--- a/src/main/resources/hw7_presentation.pptx
+++ b/src/main/resources/hw7_presentation.pptx
@@ -516,27 +516,7 @@
           <a:p>
             <a:r>
               <a:rPr lang="en-US" dirty="0" smtClean="0"/>
-              <a:t>Interact strategy example: ghost handles all </a:t>
-            </a:r>
-            <a:r>
-              <a:rPr lang="en-US" dirty="0" err="1" smtClean="0"/>
-              <a:t>pacman</a:t>
-            </a:r>
-            <a:r>
-              <a:rPr lang="en-US" dirty="0" smtClean="0"/>
-              <a:t>-ghost interactions, and </a:t>
-            </a:r>
-            <a:r>
-              <a:rPr lang="en-US" dirty="0" err="1" smtClean="0"/>
-              <a:t>pacman</a:t>
-            </a:r>
-            <a:r>
-              <a:rPr lang="en-US" dirty="0" smtClean="0"/>
-              <a:t> does not</a:t>
-            </a:r>
-            <a:r>
-              <a:rPr lang="en-US" baseline="0" dirty="0" smtClean="0"/>
-              <a:t> worry about it.</a:t>
+              <a:t>Overview of how each piece connects to use cases</a:t>
             </a:r>
             <a:endParaRPr lang="en-US" dirty="0"/>
           </a:p>
@@ -559,7 +539,7 @@
           <a:p>
             <a:fld id="{B0EC7914-C99C-EC47-BACB-EACC7A5FFFA3}" type="slidenum">
               <a:rPr lang="en-US" smtClean="0"/>
-              <a:t>6</a:t>
+              <a:t>5</a:t>
             </a:fld>
             <a:endParaRPr lang="en-US"/>
           </a:p>
@@ -568,7 +548,7 @@
     </p:spTree>
     <p:extLst>
       <p:ext uri="{BB962C8B-B14F-4D97-AF65-F5344CB8AC3E}">
-        <p14:creationId xmlns:p14="http://schemas.microsoft.com/office/powerpoint/2010/main" val="2346791306"/>
+        <p14:creationId xmlns:p14="http://schemas.microsoft.com/office/powerpoint/2010/main" val="1129418081"/>
       </p:ext>
     </p:extLst>
   </p:cSld>
@@ -624,37 +604,39 @@
           <a:p>
             <a:r>
               <a:rPr lang="en-US" dirty="0" smtClean="0"/>
-              <a:t>All </a:t>
+              <a:t>Talk about how</a:t>
+            </a:r>
+            <a:r>
+              <a:rPr lang="en-US" baseline="0" dirty="0" smtClean="0"/>
+              <a:t> interfaces satisfy use cases. </a:t>
+            </a:r>
+            <a:r>
+              <a:rPr lang="en-US" dirty="0" smtClean="0"/>
+              <a:t>Interact </a:t>
+            </a:r>
+            <a:r>
+              <a:rPr lang="en-US" dirty="0" smtClean="0"/>
+              <a:t>strategy example: ghost handles all </a:t>
             </a:r>
             <a:r>
               <a:rPr lang="en-US" dirty="0" err="1" smtClean="0"/>
-              <a:t>AGameObjects</a:t>
+              <a:t>pacman</a:t>
+            </a:r>
+            <a:r>
+              <a:rPr lang="en-US" dirty="0" smtClean="0"/>
+              <a:t>-ghost interactions, and </a:t>
+            </a:r>
+            <a:r>
+              <a:rPr lang="en-US" dirty="0" err="1" smtClean="0"/>
+              <a:t>pacman</a:t>
+            </a:r>
+            <a:r>
+              <a:rPr lang="en-US" dirty="0" smtClean="0"/>
+              <a:t> does not</a:t>
             </a:r>
             <a:r>
               <a:rPr lang="en-US" baseline="0" dirty="0" smtClean="0"/>
-              <a:t> implement </a:t>
-            </a:r>
-            <a:r>
-              <a:rPr lang="en-US" baseline="0" dirty="0" smtClean="0"/>
-              <a:t>Observer. </a:t>
-            </a:r>
-            <a:r>
-              <a:rPr lang="en-US" baseline="0" dirty="0" smtClean="0"/>
-              <a:t>Talk </a:t>
-            </a:r>
-            <a:r>
-              <a:rPr lang="en-US" dirty="0" smtClean="0"/>
-              <a:t>about inheritance structure and functions</a:t>
-            </a:r>
-            <a:r>
-              <a:rPr lang="en-US" dirty="0" smtClean="0"/>
-              <a:t>.</a:t>
-            </a:r>
-          </a:p>
-          <a:p>
-            <a:r>
-              <a:rPr lang="en-US" baseline="0" dirty="0" smtClean="0"/>
-              <a:t>Separate concrete classes for easy object creation and extensibility. </a:t>
+              <a:t> worry about it.</a:t>
             </a:r>
             <a:endParaRPr lang="en-US" dirty="0"/>
           </a:p>
@@ -677,7 +659,7 @@
           <a:p>
             <a:fld id="{B0EC7914-C99C-EC47-BACB-EACC7A5FFFA3}" type="slidenum">
               <a:rPr lang="en-US" smtClean="0"/>
-              <a:t>7</a:t>
+              <a:t>6</a:t>
             </a:fld>
             <a:endParaRPr lang="en-US"/>
           </a:p>
@@ -686,7 +668,7 @@
     </p:spTree>
     <p:extLst>
       <p:ext uri="{BB962C8B-B14F-4D97-AF65-F5344CB8AC3E}">
-        <p14:creationId xmlns:p14="http://schemas.microsoft.com/office/powerpoint/2010/main" val="940924563"/>
+        <p14:creationId xmlns:p14="http://schemas.microsoft.com/office/powerpoint/2010/main" val="2346791306"/>
       </p:ext>
     </p:extLst>
   </p:cSld>
@@ -742,15 +724,25 @@
           <a:p>
             <a:r>
               <a:rPr lang="en-US" dirty="0" smtClean="0"/>
-              <a:t>Talk about timers and </a:t>
-            </a:r>
-            <a:r>
-              <a:rPr lang="en-US" dirty="0" smtClean="0"/>
-              <a:t>values. Grid</a:t>
+              <a:t>All </a:t>
+            </a:r>
+            <a:r>
+              <a:rPr lang="en-US" dirty="0" err="1" smtClean="0"/>
+              <a:t>AGameObjects</a:t>
             </a:r>
             <a:r>
               <a:rPr lang="en-US" baseline="0" dirty="0" smtClean="0"/>
-              <a:t> size is static for easy access in concrete classes.</a:t>
+              <a:t> implement Observer. Talk </a:t>
+            </a:r>
+            <a:r>
+              <a:rPr lang="en-US" dirty="0" smtClean="0"/>
+              <a:t>about inheritance structure and functions.</a:t>
+            </a:r>
+          </a:p>
+          <a:p>
+            <a:r>
+              <a:rPr lang="en-US" baseline="0" dirty="0" smtClean="0"/>
+              <a:t>Separate concrete classes for easy object creation and extensibility. </a:t>
             </a:r>
             <a:endParaRPr lang="en-US" dirty="0"/>
           </a:p>
@@ -773,7 +765,7 @@
           <a:p>
             <a:fld id="{B0EC7914-C99C-EC47-BACB-EACC7A5FFFA3}" type="slidenum">
               <a:rPr lang="en-US" smtClean="0"/>
-              <a:t>8</a:t>
+              <a:t>7</a:t>
             </a:fld>
             <a:endParaRPr lang="en-US"/>
           </a:p>
@@ -782,7 +774,7 @@
     </p:spTree>
     <p:extLst>
       <p:ext uri="{BB962C8B-B14F-4D97-AF65-F5344CB8AC3E}">
-        <p14:creationId xmlns:p14="http://schemas.microsoft.com/office/powerpoint/2010/main" val="2447390117"/>
+        <p14:creationId xmlns:p14="http://schemas.microsoft.com/office/powerpoint/2010/main" val="940924563"/>
       </p:ext>
     </p:extLst>
   </p:cSld>
@@ -838,11 +830,11 @@
           <a:p>
             <a:r>
               <a:rPr lang="en-US" dirty="0" smtClean="0"/>
-              <a:t>What each request</a:t>
+              <a:t>Talk about timers and values. Grid</a:t>
             </a:r>
             <a:r>
               <a:rPr lang="en-US" baseline="0" dirty="0" smtClean="0"/>
-              <a:t> does</a:t>
+              <a:t> size is static for easy access in concrete classes.</a:t>
             </a:r>
             <a:endParaRPr lang="en-US" dirty="0"/>
           </a:p>
@@ -865,7 +857,7 @@
           <a:p>
             <a:fld id="{B0EC7914-C99C-EC47-BACB-EACC7A5FFFA3}" type="slidenum">
               <a:rPr lang="en-US" smtClean="0"/>
-              <a:t>9</a:t>
+              <a:t>8</a:t>
             </a:fld>
             <a:endParaRPr lang="en-US"/>
           </a:p>
@@ -874,7 +866,7 @@
     </p:spTree>
     <p:extLst>
       <p:ext uri="{BB962C8B-B14F-4D97-AF65-F5344CB8AC3E}">
-        <p14:creationId xmlns:p14="http://schemas.microsoft.com/office/powerpoint/2010/main" val="3369376564"/>
+        <p14:creationId xmlns:p14="http://schemas.microsoft.com/office/powerpoint/2010/main" val="2447390117"/>
       </p:ext>
     </p:extLst>
   </p:cSld>
@@ -930,15 +922,123 @@
           <a:p>
             <a:r>
               <a:rPr lang="en-US" dirty="0" smtClean="0"/>
+              <a:t>What each request</a:t>
+            </a:r>
+            <a:r>
+              <a:rPr lang="en-US" baseline="0" dirty="0" smtClean="0"/>
+              <a:t> does</a:t>
+            </a:r>
+            <a:endParaRPr lang="en-US" dirty="0"/>
+          </a:p>
+        </p:txBody>
+      </p:sp>
+      <p:sp>
+        <p:nvSpPr>
+          <p:cNvPr id="4" name="Slide Number Placeholder 3"/>
+          <p:cNvSpPr>
+            <a:spLocks noGrp="1"/>
+          </p:cNvSpPr>
+          <p:nvPr>
+            <p:ph type="sldNum" sz="quarter" idx="10"/>
+          </p:nvPr>
+        </p:nvSpPr>
+        <p:spPr/>
+        <p:txBody>
+          <a:bodyPr/>
+          <a:lstStyle/>
+          <a:p>
+            <a:fld id="{B0EC7914-C99C-EC47-BACB-EACC7A5FFFA3}" type="slidenum">
+              <a:rPr lang="en-US" smtClean="0"/>
+              <a:t>9</a:t>
+            </a:fld>
+            <a:endParaRPr lang="en-US"/>
+          </a:p>
+        </p:txBody>
+      </p:sp>
+    </p:spTree>
+    <p:extLst>
+      <p:ext uri="{BB962C8B-B14F-4D97-AF65-F5344CB8AC3E}">
+        <p14:creationId xmlns:p14="http://schemas.microsoft.com/office/powerpoint/2010/main" val="3369376564"/>
+      </p:ext>
+    </p:extLst>
+  </p:cSld>
+  <p:clrMapOvr>
+    <a:masterClrMapping/>
+  </p:clrMapOvr>
+</p:notes>
+</file>
+
+<file path=ppt/notesSlides/notesSlide6.xml><?xml version="1.0" encoding="utf-8"?>
+<p:notes xmlns:a="http://schemas.openxmlformats.org/drawingml/2006/main" xmlns:r="http://schemas.openxmlformats.org/officeDocument/2006/relationships" xmlns:p="http://schemas.openxmlformats.org/presentationml/2006/main">
+  <p:cSld>
+    <p:spTree>
+      <p:nvGrpSpPr>
+        <p:cNvPr id="1" name=""/>
+        <p:cNvGrpSpPr/>
+        <p:nvPr/>
+      </p:nvGrpSpPr>
+      <p:grpSpPr>
+        <a:xfrm>
+          <a:off x="0" y="0"/>
+          <a:ext cx="0" cy="0"/>
+          <a:chOff x="0" y="0"/>
+          <a:chExt cx="0" cy="0"/>
+        </a:xfrm>
+      </p:grpSpPr>
+      <p:sp>
+        <p:nvSpPr>
+          <p:cNvPr id="2" name="Slide Image Placeholder 1"/>
+          <p:cNvSpPr>
+            <a:spLocks noGrp="1" noRot="1" noChangeAspect="1"/>
+          </p:cNvSpPr>
+          <p:nvPr>
+            <p:ph type="sldImg"/>
+          </p:nvPr>
+        </p:nvSpPr>
+        <p:spPr/>
+      </p:sp>
+      <p:sp>
+        <p:nvSpPr>
+          <p:cNvPr id="3" name="Notes Placeholder 2"/>
+          <p:cNvSpPr>
+            <a:spLocks noGrp="1"/>
+          </p:cNvSpPr>
+          <p:nvPr>
+            <p:ph type="body" idx="1"/>
+          </p:nvPr>
+        </p:nvSpPr>
+        <p:spPr/>
+        <p:txBody>
+          <a:bodyPr/>
+          <a:lstStyle/>
+          <a:p>
+            <a:r>
+              <a:rPr lang="en-US" baseline="0" dirty="0" smtClean="0"/>
+              <a:t>Design decisions </a:t>
+            </a:r>
+            <a:r>
+              <a:rPr lang="mr-IN" baseline="0" dirty="0" smtClean="0"/>
+              <a:t>–</a:t>
+            </a:r>
+            <a:r>
+              <a:rPr lang="en-US" baseline="0" dirty="0" smtClean="0"/>
+              <a:t> flashing ghosts, blinking dots, </a:t>
+            </a:r>
+            <a:r>
+              <a:rPr lang="en-US" baseline="0" dirty="0" err="1" smtClean="0"/>
+              <a:t>pacman</a:t>
+            </a:r>
+            <a:r>
+              <a:rPr lang="en-US" baseline="0" dirty="0" smtClean="0"/>
+              <a:t> animation do not affect game so are handled only in view. </a:t>
+            </a:r>
+            <a:r>
+              <a:rPr lang="en-US" dirty="0" smtClean="0"/>
               <a:t>Talk about how we are drawing different</a:t>
             </a:r>
             <a:r>
               <a:rPr lang="en-US" baseline="0" dirty="0" smtClean="0"/>
-              <a:t> game objects, link to </a:t>
-            </a:r>
-            <a:r>
-              <a:rPr lang="en-US" baseline="0" dirty="0" err="1" smtClean="0"/>
-              <a:t>heroku</a:t>
+              <a:t> game objects. When to call each request</a:t>
             </a:r>
             <a:endParaRPr lang="en-US" dirty="0"/>
           </a:p>
@@ -4017,12 +4117,24 @@
           </a:xfrm>
         </p:spPr>
         <p:txBody>
-          <a:bodyPr/>
-          <a:lstStyle/>
-          <a:p>
-            <a:r>
-              <a:rPr lang="en-US" dirty="0" smtClean="0"/>
-              <a:t>Jonathan Wang, Manu </a:t>
+          <a:bodyPr>
+            <a:normAutofit fontScale="92500" lnSpcReduction="20000"/>
+          </a:bodyPr>
+          <a:lstStyle/>
+          <a:p>
+            <a:r>
+              <a:rPr lang="en-US" dirty="0" smtClean="0"/>
+              <a:t>Team Houston</a:t>
+            </a:r>
+          </a:p>
+          <a:p>
+            <a:r>
+              <a:rPr lang="en-US" dirty="0" smtClean="0"/>
+              <a:t>Jonathan </a:t>
+            </a:r>
+            <a:r>
+              <a:rPr lang="en-US" dirty="0" smtClean="0"/>
+              <a:t>Wang, Manu </a:t>
             </a:r>
             <a:r>
               <a:rPr lang="en-US" dirty="0" err="1" smtClean="0"/>
@@ -4337,7 +4449,6 @@
               <a:rPr lang="en-US" dirty="0" smtClean="0"/>
               <a:t>Spawn fruit periodically</a:t>
             </a:r>
-            <a:endParaRPr lang="en-US" dirty="0" smtClean="0"/>
           </a:p>
           <a:p>
             <a:pPr lvl="1"/>
@@ -4350,15 +4461,7 @@
             <a:pPr lvl="1"/>
             <a:r>
               <a:rPr lang="en-US" dirty="0" smtClean="0"/>
-              <a:t>Track score, lives, </a:t>
-            </a:r>
-            <a:r>
-              <a:rPr lang="en-US" dirty="0" smtClean="0"/>
-              <a:t>timers, etc</a:t>
-            </a:r>
-            <a:r>
-              <a:rPr lang="en-US" dirty="0" smtClean="0"/>
-              <a:t>.</a:t>
+              <a:t>Track score, lives, timers, etc.</a:t>
             </a:r>
             <a:endParaRPr lang="en-US" dirty="0"/>
           </a:p>
@@ -4900,11 +5003,7 @@
             </a:r>
             <a:r>
               <a:rPr lang="en-US" dirty="0" smtClean="0"/>
-              <a:t> one-directional </a:t>
-            </a:r>
-            <a:r>
-              <a:rPr lang="en-US" dirty="0" smtClean="0"/>
-              <a:t>interactions</a:t>
+              <a:t> one-directional interactions</a:t>
             </a:r>
           </a:p>
         </p:txBody>

</xml_diff>

<commit_message>
update comments and presentation slides.
</commit_message>
<xml_diff>
--- a/src/main/resources/hw7_presentation.pptx
+++ b/src/main/resources/hw7_presentation.pptx
@@ -5,20 +5,24 @@
     <p:sldMasterId id="2147483648" r:id="rId1"/>
   </p:sldMasterIdLst>
   <p:notesMasterIdLst>
-    <p:notesMasterId r:id="rId13"/>
+    <p:notesMasterId r:id="rId17"/>
   </p:notesMasterIdLst>
   <p:sldIdLst>
     <p:sldId id="256" r:id="rId2"/>
-    <p:sldId id="264" r:id="rId3"/>
-    <p:sldId id="267" r:id="rId4"/>
-    <p:sldId id="268" r:id="rId5"/>
-    <p:sldId id="257" r:id="rId6"/>
-    <p:sldId id="259" r:id="rId7"/>
-    <p:sldId id="260" r:id="rId8"/>
-    <p:sldId id="261" r:id="rId9"/>
-    <p:sldId id="262" r:id="rId10"/>
-    <p:sldId id="265" r:id="rId11"/>
-    <p:sldId id="266" r:id="rId12"/>
+    <p:sldId id="273" r:id="rId3"/>
+    <p:sldId id="274" r:id="rId4"/>
+    <p:sldId id="270" r:id="rId5"/>
+    <p:sldId id="260" r:id="rId6"/>
+    <p:sldId id="261" r:id="rId7"/>
+    <p:sldId id="262" r:id="rId8"/>
+    <p:sldId id="265" r:id="rId9"/>
+    <p:sldId id="266" r:id="rId10"/>
+    <p:sldId id="271" r:id="rId11"/>
+    <p:sldId id="267" r:id="rId12"/>
+    <p:sldId id="268" r:id="rId13"/>
+    <p:sldId id="264" r:id="rId14"/>
+    <p:sldId id="275" r:id="rId15"/>
+    <p:sldId id="272" r:id="rId16"/>
   </p:sldIdLst>
   <p:sldSz cx="9144000" cy="6858000" type="screen4x3"/>
   <p:notesSz cx="6858000" cy="9144000"/>
@@ -218,7 +222,7 @@
           <a:p>
             <a:fld id="{F47BD92E-FF1D-6A4E-BE14-EDEAC00E0CAA}" type="datetimeFigureOut">
               <a:rPr lang="en-US" smtClean="0"/>
-              <a:t>10/25/18</a:t>
+              <a:t>11/2/18</a:t>
             </a:fld>
             <a:endParaRPr lang="en-US"/>
           </a:p>
@@ -530,10 +534,6 @@
           <a:bodyPr/>
           <a:lstStyle/>
           <a:p>
-            <a:r>
-              <a:rPr lang="en-US" dirty="0" smtClean="0"/>
-              <a:t>Overview of how each piece connects to use cases</a:t>
-            </a:r>
             <a:endParaRPr lang="en-US" dirty="0"/>
           </a:p>
         </p:txBody>
@@ -555,7 +555,7 @@
           <a:p>
             <a:fld id="{B0EC7914-C99C-EC47-BACB-EACC7A5FFFA3}" type="slidenum">
               <a:rPr lang="en-US" smtClean="0"/>
-              <a:t>5</a:t>
+              <a:t>3</a:t>
             </a:fld>
             <a:endParaRPr lang="en-US"/>
           </a:p>
@@ -564,7 +564,7 @@
     </p:spTree>
     <p:extLst>
       <p:ext uri="{BB962C8B-B14F-4D97-AF65-F5344CB8AC3E}">
-        <p14:creationId xmlns:p14="http://schemas.microsoft.com/office/powerpoint/2010/main" val="1129418081"/>
+        <p14:creationId xmlns:p14="http://schemas.microsoft.com/office/powerpoint/2010/main" val="214430660"/>
       </p:ext>
     </p:extLst>
   </p:cSld>
@@ -620,35 +620,25 @@
           <a:p>
             <a:r>
               <a:rPr lang="en-US" dirty="0" smtClean="0"/>
-              <a:t>Talk about how</a:t>
+              <a:t>All </a:t>
+            </a:r>
+            <a:r>
+              <a:rPr lang="en-US" dirty="0" err="1" smtClean="0"/>
+              <a:t>AGameObjects</a:t>
             </a:r>
             <a:r>
               <a:rPr lang="en-US" baseline="0" dirty="0" smtClean="0"/>
-              <a:t> interfaces satisfy use cases. </a:t>
+              <a:t> implement Observer. Talk </a:t>
             </a:r>
             <a:r>
               <a:rPr lang="en-US" dirty="0" smtClean="0"/>
-              <a:t>Interact strategy example: ghost handles all </a:t>
-            </a:r>
-            <a:r>
-              <a:rPr lang="en-US" dirty="0" err="1" smtClean="0"/>
-              <a:t>pacman</a:t>
-            </a:r>
-            <a:r>
-              <a:rPr lang="en-US" dirty="0" smtClean="0"/>
-              <a:t>-ghost interactions, and </a:t>
-            </a:r>
-            <a:r>
-              <a:rPr lang="en-US" dirty="0" err="1" smtClean="0"/>
-              <a:t>pacman</a:t>
-            </a:r>
-            <a:r>
-              <a:rPr lang="en-US" dirty="0" smtClean="0"/>
-              <a:t> does not</a:t>
-            </a:r>
+              <a:t>about inheritance structure and functions.</a:t>
+            </a:r>
+          </a:p>
+          <a:p>
             <a:r>
               <a:rPr lang="en-US" baseline="0" dirty="0" smtClean="0"/>
-              <a:t> worry about it.</a:t>
+              <a:t>Separate concrete classes for easy object creation and extensibility. </a:t>
             </a:r>
             <a:endParaRPr lang="en-US" dirty="0"/>
           </a:p>
@@ -671,7 +661,7 @@
           <a:p>
             <a:fld id="{B0EC7914-C99C-EC47-BACB-EACC7A5FFFA3}" type="slidenum">
               <a:rPr lang="en-US" smtClean="0"/>
-              <a:t>6</a:t>
+              <a:t>5</a:t>
             </a:fld>
             <a:endParaRPr lang="en-US"/>
           </a:p>
@@ -680,7 +670,7 @@
     </p:spTree>
     <p:extLst>
       <p:ext uri="{BB962C8B-B14F-4D97-AF65-F5344CB8AC3E}">
-        <p14:creationId xmlns:p14="http://schemas.microsoft.com/office/powerpoint/2010/main" val="2346791306"/>
+        <p14:creationId xmlns:p14="http://schemas.microsoft.com/office/powerpoint/2010/main" val="940924563"/>
       </p:ext>
     </p:extLst>
   </p:cSld>
@@ -736,25 +726,11 @@
           <a:p>
             <a:r>
               <a:rPr lang="en-US" dirty="0" smtClean="0"/>
-              <a:t>All </a:t>
-            </a:r>
-            <a:r>
-              <a:rPr lang="en-US" dirty="0" err="1" smtClean="0"/>
-              <a:t>AGameObjects</a:t>
+              <a:t>Talk about timers and values. Grid</a:t>
             </a:r>
             <a:r>
               <a:rPr lang="en-US" baseline="0" dirty="0" smtClean="0"/>
-              <a:t> implement Observer. Talk </a:t>
-            </a:r>
-            <a:r>
-              <a:rPr lang="en-US" dirty="0" smtClean="0"/>
-              <a:t>about inheritance structure and functions.</a:t>
-            </a:r>
-          </a:p>
-          <a:p>
-            <a:r>
-              <a:rPr lang="en-US" baseline="0" dirty="0" smtClean="0"/>
-              <a:t>Separate concrete classes for easy object creation and extensibility. </a:t>
+              <a:t> size is static for easy access in concrete classes.</a:t>
             </a:r>
             <a:endParaRPr lang="en-US" dirty="0"/>
           </a:p>
@@ -777,7 +753,7 @@
           <a:p>
             <a:fld id="{B0EC7914-C99C-EC47-BACB-EACC7A5FFFA3}" type="slidenum">
               <a:rPr lang="en-US" smtClean="0"/>
-              <a:t>7</a:t>
+              <a:t>6</a:t>
             </a:fld>
             <a:endParaRPr lang="en-US"/>
           </a:p>
@@ -786,7 +762,7 @@
     </p:spTree>
     <p:extLst>
       <p:ext uri="{BB962C8B-B14F-4D97-AF65-F5344CB8AC3E}">
-        <p14:creationId xmlns:p14="http://schemas.microsoft.com/office/powerpoint/2010/main" val="940924563"/>
+        <p14:creationId xmlns:p14="http://schemas.microsoft.com/office/powerpoint/2010/main" val="2447390117"/>
       </p:ext>
     </p:extLst>
   </p:cSld>
@@ -842,11 +818,11 @@
           <a:p>
             <a:r>
               <a:rPr lang="en-US" dirty="0" smtClean="0"/>
-              <a:t>Talk about timers and values. Grid</a:t>
+              <a:t>What each request</a:t>
             </a:r>
             <a:r>
               <a:rPr lang="en-US" baseline="0" dirty="0" smtClean="0"/>
-              <a:t> size is static for easy access in concrete classes.</a:t>
+              <a:t> does</a:t>
             </a:r>
             <a:endParaRPr lang="en-US" dirty="0"/>
           </a:p>
@@ -869,7 +845,7 @@
           <a:p>
             <a:fld id="{B0EC7914-C99C-EC47-BACB-EACC7A5FFFA3}" type="slidenum">
               <a:rPr lang="en-US" smtClean="0"/>
-              <a:t>8</a:t>
+              <a:t>7</a:t>
             </a:fld>
             <a:endParaRPr lang="en-US"/>
           </a:p>
@@ -878,7 +854,7 @@
     </p:spTree>
     <p:extLst>
       <p:ext uri="{BB962C8B-B14F-4D97-AF65-F5344CB8AC3E}">
-        <p14:creationId xmlns:p14="http://schemas.microsoft.com/office/powerpoint/2010/main" val="2447390117"/>
+        <p14:creationId xmlns:p14="http://schemas.microsoft.com/office/powerpoint/2010/main" val="3369376564"/>
       </p:ext>
     </p:extLst>
   </p:cSld>
@@ -933,12 +909,32 @@
           <a:lstStyle/>
           <a:p>
             <a:r>
+              <a:rPr lang="en-US" baseline="0" dirty="0" smtClean="0"/>
+              <a:t>Design decisions </a:t>
+            </a:r>
+            <a:r>
+              <a:rPr lang="mr-IN" baseline="0" dirty="0" smtClean="0"/>
+              <a:t>–</a:t>
+            </a:r>
+            <a:r>
+              <a:rPr lang="en-US" baseline="0" dirty="0" smtClean="0"/>
+              <a:t> flashing ghosts, blinking dots, </a:t>
+            </a:r>
+            <a:r>
+              <a:rPr lang="en-US" baseline="0" dirty="0" err="1" smtClean="0"/>
+              <a:t>pacman</a:t>
+            </a:r>
+            <a:r>
+              <a:rPr lang="en-US" baseline="0" dirty="0" smtClean="0"/>
+              <a:t> animation do not affect game so are handled only in view. </a:t>
+            </a:r>
+            <a:r>
               <a:rPr lang="en-US" dirty="0" smtClean="0"/>
-              <a:t>What each request</a:t>
+              <a:t>Talk about how we are drawing different</a:t>
             </a:r>
             <a:r>
               <a:rPr lang="en-US" baseline="0" dirty="0" smtClean="0"/>
-              <a:t> does</a:t>
+              <a:t> game objects. When to call each request</a:t>
             </a:r>
             <a:endParaRPr lang="en-US" dirty="0"/>
           </a:p>
@@ -961,7 +957,7 @@
           <a:p>
             <a:fld id="{B0EC7914-C99C-EC47-BACB-EACC7A5FFFA3}" type="slidenum">
               <a:rPr lang="en-US" smtClean="0"/>
-              <a:t>9</a:t>
+              <a:t>8</a:t>
             </a:fld>
             <a:endParaRPr lang="en-US"/>
           </a:p>
@@ -970,7 +966,7 @@
     </p:spTree>
     <p:extLst>
       <p:ext uri="{BB962C8B-B14F-4D97-AF65-F5344CB8AC3E}">
-        <p14:creationId xmlns:p14="http://schemas.microsoft.com/office/powerpoint/2010/main" val="3369376564"/>
+        <p14:creationId xmlns:p14="http://schemas.microsoft.com/office/powerpoint/2010/main" val="824070473"/>
       </p:ext>
     </p:extLst>
   </p:cSld>
@@ -1025,32 +1021,8 @@
           <a:lstStyle/>
           <a:p>
             <a:r>
-              <a:rPr lang="en-US" baseline="0" dirty="0" smtClean="0"/>
-              <a:t>Design decisions </a:t>
-            </a:r>
-            <a:r>
-              <a:rPr lang="mr-IN" baseline="0" dirty="0" smtClean="0"/>
-              <a:t>–</a:t>
-            </a:r>
-            <a:r>
-              <a:rPr lang="en-US" baseline="0" dirty="0" smtClean="0"/>
-              <a:t> flashing ghosts, blinking dots, </a:t>
-            </a:r>
-            <a:r>
-              <a:rPr lang="en-US" baseline="0" dirty="0" err="1" smtClean="0"/>
-              <a:t>pacman</a:t>
-            </a:r>
-            <a:r>
-              <a:rPr lang="en-US" baseline="0" dirty="0" smtClean="0"/>
-              <a:t> animation do not affect game so are handled only in view. </a:t>
-            </a:r>
-            <a:r>
               <a:rPr lang="en-US" dirty="0" smtClean="0"/>
-              <a:t>Talk about how we are drawing different</a:t>
-            </a:r>
-            <a:r>
-              <a:rPr lang="en-US" baseline="0" dirty="0" smtClean="0"/>
-              <a:t> game objects. When to call each request</a:t>
+              <a:t>Overview of how each piece connects to use cases</a:t>
             </a:r>
             <a:endParaRPr lang="en-US" dirty="0"/>
           </a:p>
@@ -1073,7 +1045,7 @@
           <a:p>
             <a:fld id="{B0EC7914-C99C-EC47-BACB-EACC7A5FFFA3}" type="slidenum">
               <a:rPr lang="en-US" smtClean="0"/>
-              <a:t>10</a:t>
+              <a:t>14</a:t>
             </a:fld>
             <a:endParaRPr lang="en-US"/>
           </a:p>
@@ -1082,7 +1054,123 @@
     </p:spTree>
     <p:extLst>
       <p:ext uri="{BB962C8B-B14F-4D97-AF65-F5344CB8AC3E}">
-        <p14:creationId xmlns:p14="http://schemas.microsoft.com/office/powerpoint/2010/main" val="824070473"/>
+        <p14:creationId xmlns:p14="http://schemas.microsoft.com/office/powerpoint/2010/main" val="1194889481"/>
+      </p:ext>
+    </p:extLst>
+  </p:cSld>
+  <p:clrMapOvr>
+    <a:masterClrMapping/>
+  </p:clrMapOvr>
+</p:notes>
+</file>
+
+<file path=ppt/notesSlides/notesSlide7.xml><?xml version="1.0" encoding="utf-8"?>
+<p:notes xmlns:a="http://schemas.openxmlformats.org/drawingml/2006/main" xmlns:r="http://schemas.openxmlformats.org/officeDocument/2006/relationships" xmlns:p="http://schemas.openxmlformats.org/presentationml/2006/main">
+  <p:cSld>
+    <p:spTree>
+      <p:nvGrpSpPr>
+        <p:cNvPr id="1" name=""/>
+        <p:cNvGrpSpPr/>
+        <p:nvPr/>
+      </p:nvGrpSpPr>
+      <p:grpSpPr>
+        <a:xfrm>
+          <a:off x="0" y="0"/>
+          <a:ext cx="0" cy="0"/>
+          <a:chOff x="0" y="0"/>
+          <a:chExt cx="0" cy="0"/>
+        </a:xfrm>
+      </p:grpSpPr>
+      <p:sp>
+        <p:nvSpPr>
+          <p:cNvPr id="2" name="Slide Image Placeholder 1"/>
+          <p:cNvSpPr>
+            <a:spLocks noGrp="1" noRot="1" noChangeAspect="1"/>
+          </p:cNvSpPr>
+          <p:nvPr>
+            <p:ph type="sldImg"/>
+          </p:nvPr>
+        </p:nvSpPr>
+        <p:spPr/>
+      </p:sp>
+      <p:sp>
+        <p:nvSpPr>
+          <p:cNvPr id="3" name="Notes Placeholder 2"/>
+          <p:cNvSpPr>
+            <a:spLocks noGrp="1"/>
+          </p:cNvSpPr>
+          <p:nvPr>
+            <p:ph type="body" idx="1"/>
+          </p:nvPr>
+        </p:nvSpPr>
+        <p:spPr/>
+        <p:txBody>
+          <a:bodyPr/>
+          <a:lstStyle/>
+          <a:p>
+            <a:r>
+              <a:rPr lang="en-US" dirty="0" smtClean="0"/>
+              <a:t>Talk about how</a:t>
+            </a:r>
+            <a:r>
+              <a:rPr lang="en-US" baseline="0" dirty="0" smtClean="0"/>
+              <a:t> interfaces satisfy use cases. </a:t>
+            </a:r>
+            <a:r>
+              <a:rPr lang="en-US" dirty="0" smtClean="0"/>
+              <a:t>Interact strategy example: ghost handles all </a:t>
+            </a:r>
+            <a:r>
+              <a:rPr lang="en-US" dirty="0" err="1" smtClean="0"/>
+              <a:t>pacman</a:t>
+            </a:r>
+            <a:r>
+              <a:rPr lang="en-US" dirty="0" smtClean="0"/>
+              <a:t>-ghost interactions, and </a:t>
+            </a:r>
+            <a:r>
+              <a:rPr lang="en-US" dirty="0" err="1" smtClean="0"/>
+              <a:t>pacman</a:t>
+            </a:r>
+            <a:r>
+              <a:rPr lang="en-US" dirty="0" smtClean="0"/>
+              <a:t> does not</a:t>
+            </a:r>
+            <a:r>
+              <a:rPr lang="en-US" baseline="0" dirty="0" smtClean="0"/>
+              <a:t> worry about it.</a:t>
+            </a:r>
+            <a:endParaRPr lang="en-US" dirty="0"/>
+          </a:p>
+        </p:txBody>
+      </p:sp>
+      <p:sp>
+        <p:nvSpPr>
+          <p:cNvPr id="4" name="Slide Number Placeholder 3"/>
+          <p:cNvSpPr>
+            <a:spLocks noGrp="1"/>
+          </p:cNvSpPr>
+          <p:nvPr>
+            <p:ph type="sldNum" sz="quarter" idx="10"/>
+          </p:nvPr>
+        </p:nvSpPr>
+        <p:spPr/>
+        <p:txBody>
+          <a:bodyPr/>
+          <a:lstStyle/>
+          <a:p>
+            <a:fld id="{B0EC7914-C99C-EC47-BACB-EACC7A5FFFA3}" type="slidenum">
+              <a:rPr lang="en-US" smtClean="0"/>
+              <a:t>15</a:t>
+            </a:fld>
+            <a:endParaRPr lang="en-US"/>
+          </a:p>
+        </p:txBody>
+      </p:sp>
+    </p:spTree>
+    <p:extLst>
+      <p:ext uri="{BB962C8B-B14F-4D97-AF65-F5344CB8AC3E}">
+        <p14:creationId xmlns:p14="http://schemas.microsoft.com/office/powerpoint/2010/main" val="22833653"/>
       </p:ext>
     </p:extLst>
   </p:cSld>
@@ -1273,7 +1361,7 @@
           <a:p>
             <a:fld id="{E2016EA5-1104-9947-BC32-BE5ED901B257}" type="datetimeFigureOut">
               <a:rPr lang="en-US" smtClean="0"/>
-              <a:t>10/25/18</a:t>
+              <a:t>11/2/18</a:t>
             </a:fld>
             <a:endParaRPr lang="en-US"/>
           </a:p>
@@ -1443,7 +1531,7 @@
           <a:p>
             <a:fld id="{E2016EA5-1104-9947-BC32-BE5ED901B257}" type="datetimeFigureOut">
               <a:rPr lang="en-US" smtClean="0"/>
-              <a:t>10/25/18</a:t>
+              <a:t>11/2/18</a:t>
             </a:fld>
             <a:endParaRPr lang="en-US"/>
           </a:p>
@@ -1623,7 +1711,7 @@
           <a:p>
             <a:fld id="{E2016EA5-1104-9947-BC32-BE5ED901B257}" type="datetimeFigureOut">
               <a:rPr lang="en-US" smtClean="0"/>
-              <a:t>10/25/18</a:t>
+              <a:t>11/2/18</a:t>
             </a:fld>
             <a:endParaRPr lang="en-US"/>
           </a:p>
@@ -1793,7 +1881,7 @@
           <a:p>
             <a:fld id="{E2016EA5-1104-9947-BC32-BE5ED901B257}" type="datetimeFigureOut">
               <a:rPr lang="en-US" smtClean="0"/>
-              <a:t>10/25/18</a:t>
+              <a:t>11/2/18</a:t>
             </a:fld>
             <a:endParaRPr lang="en-US"/>
           </a:p>
@@ -2039,7 +2127,7 @@
           <a:p>
             <a:fld id="{E2016EA5-1104-9947-BC32-BE5ED901B257}" type="datetimeFigureOut">
               <a:rPr lang="en-US" smtClean="0"/>
-              <a:t>10/25/18</a:t>
+              <a:t>11/2/18</a:t>
             </a:fld>
             <a:endParaRPr lang="en-US"/>
           </a:p>
@@ -2327,7 +2415,7 @@
           <a:p>
             <a:fld id="{E2016EA5-1104-9947-BC32-BE5ED901B257}" type="datetimeFigureOut">
               <a:rPr lang="en-US" smtClean="0"/>
-              <a:t>10/25/18</a:t>
+              <a:t>11/2/18</a:t>
             </a:fld>
             <a:endParaRPr lang="en-US"/>
           </a:p>
@@ -2749,7 +2837,7 @@
           <a:p>
             <a:fld id="{E2016EA5-1104-9947-BC32-BE5ED901B257}" type="datetimeFigureOut">
               <a:rPr lang="en-US" smtClean="0"/>
-              <a:t>10/25/18</a:t>
+              <a:t>11/2/18</a:t>
             </a:fld>
             <a:endParaRPr lang="en-US"/>
           </a:p>
@@ -2867,7 +2955,7 @@
           <a:p>
             <a:fld id="{E2016EA5-1104-9947-BC32-BE5ED901B257}" type="datetimeFigureOut">
               <a:rPr lang="en-US" smtClean="0"/>
-              <a:t>10/25/18</a:t>
+              <a:t>11/2/18</a:t>
             </a:fld>
             <a:endParaRPr lang="en-US"/>
           </a:p>
@@ -2962,7 +3050,7 @@
           <a:p>
             <a:fld id="{E2016EA5-1104-9947-BC32-BE5ED901B257}" type="datetimeFigureOut">
               <a:rPr lang="en-US" smtClean="0"/>
-              <a:t>10/25/18</a:t>
+              <a:t>11/2/18</a:t>
             </a:fld>
             <a:endParaRPr lang="en-US"/>
           </a:p>
@@ -3239,7 +3327,7 @@
           <a:p>
             <a:fld id="{E2016EA5-1104-9947-BC32-BE5ED901B257}" type="datetimeFigureOut">
               <a:rPr lang="en-US" smtClean="0"/>
-              <a:t>10/25/18</a:t>
+              <a:t>11/2/18</a:t>
             </a:fld>
             <a:endParaRPr lang="en-US"/>
           </a:p>
@@ -3492,7 +3580,7 @@
           <a:p>
             <a:fld id="{E2016EA5-1104-9947-BC32-BE5ED901B257}" type="datetimeFigureOut">
               <a:rPr lang="en-US" smtClean="0"/>
-              <a:t>10/25/18</a:t>
+              <a:t>11/2/18</a:t>
             </a:fld>
             <a:endParaRPr lang="en-US"/>
           </a:p>
@@ -3705,7 +3793,7 @@
           <a:p>
             <a:fld id="{E2016EA5-1104-9947-BC32-BE5ED901B257}" type="datetimeFigureOut">
               <a:rPr lang="en-US" smtClean="0"/>
-              <a:t>10/25/18</a:t>
+              <a:t>11/2/18</a:t>
             </a:fld>
             <a:endParaRPr lang="en-US"/>
           </a:p>
@@ -4101,12 +4189,28 @@
           <a:lstStyle/>
           <a:p>
             <a:r>
-              <a:rPr lang="en-US" dirty="0" err="1" smtClean="0"/>
+              <a:rPr lang="en-US" dirty="0" smtClean="0"/>
               <a:t>Pacman</a:t>
             </a:r>
             <a:r>
+              <a:rPr lang="zh-CN" altLang="en-US" dirty="0" smtClean="0"/>
+              <a:t> </a:t>
+            </a:r>
+            <a:r>
+              <a:rPr lang="en-US" altLang="zh-CN" dirty="0" smtClean="0"/>
+              <a:t>Final</a:t>
+            </a:r>
+            <a:r>
               <a:rPr lang="en-US" dirty="0" smtClean="0"/>
-              <a:t> Game API Design</a:t>
+              <a:t> Game</a:t>
+            </a:r>
+            <a:r>
+              <a:rPr lang="zh-CN" altLang="en-US" dirty="0" smtClean="0"/>
+              <a:t> </a:t>
+            </a:r>
+            <a:r>
+              <a:rPr lang="en-US" dirty="0" smtClean="0"/>
+              <a:t>Design</a:t>
             </a:r>
             <a:endParaRPr lang="en-US" dirty="0"/>
           </a:p>
@@ -4190,6 +4294,13 @@
   <p:clrMapOvr>
     <a:masterClrMapping/>
   </p:clrMapOvr>
+  <p:timing>
+    <p:tnLst>
+      <p:par>
+        <p:cTn id="1" dur="indefinite" restart="never" nodeType="tmRoot"/>
+      </p:par>
+    </p:tnLst>
+  </p:timing>
 </p:sld>
 </file>
 
@@ -4225,41 +4336,13 @@
           <a:bodyPr/>
           <a:lstStyle/>
           <a:p>
-            <a:r>
-              <a:rPr lang="en-US" dirty="0" smtClean="0"/>
-              <a:t>View</a:t>
-            </a:r>
-            <a:endParaRPr lang="en-US" dirty="0"/>
-          </a:p>
-        </p:txBody>
-      </p:sp>
-      <p:pic>
-        <p:nvPicPr>
-          <p:cNvPr id="13" name="Picture 12"/>
-          <p:cNvPicPr>
-            <a:picLocks noChangeAspect="1"/>
-          </p:cNvPicPr>
-          <p:nvPr/>
-        </p:nvPicPr>
-        <p:blipFill>
-          <a:blip r:embed="rId3"/>
-          <a:stretch>
-            <a:fillRect/>
-          </a:stretch>
-        </p:blipFill>
-        <p:spPr>
-          <a:xfrm>
-            <a:off x="995637" y="2187564"/>
-            <a:ext cx="6985000" cy="4483100"/>
-          </a:xfrm>
-          <a:prstGeom prst="rect">
-            <a:avLst/>
-          </a:prstGeom>
-        </p:spPr>
-      </p:pic>
-      <p:sp>
-        <p:nvSpPr>
-          <p:cNvPr id="14" name="Content Placeholder 2"/>
+            <a:endParaRPr lang="en-US"/>
+          </a:p>
+        </p:txBody>
+      </p:sp>
+      <p:sp>
+        <p:nvSpPr>
+          <p:cNvPr id="3" name="Content Placeholder 2"/>
           <p:cNvSpPr>
             <a:spLocks noGrp="1"/>
           </p:cNvSpPr>
@@ -4267,60 +4350,32 @@
             <p:ph idx="1"/>
           </p:nvPr>
         </p:nvSpPr>
-        <p:spPr>
-          <a:xfrm>
-            <a:off x="457200" y="1600200"/>
-            <a:ext cx="8360336" cy="4525963"/>
-          </a:xfrm>
-        </p:spPr>
-        <p:txBody>
-          <a:bodyPr/>
-          <a:lstStyle/>
-          <a:p>
-            <a:r>
-              <a:rPr lang="en-US" dirty="0">
-                <a:hlinkClick r:id="rId4"/>
-              </a:rPr>
-              <a:t>http://</a:t>
-            </a:r>
-            <a:r>
-              <a:rPr lang="en-US" dirty="0" err="1">
-                <a:hlinkClick r:id="rId4"/>
-              </a:rPr>
-              <a:t>pacman</a:t>
-            </a:r>
-            <a:r>
-              <a:rPr lang="en-US" dirty="0">
-                <a:hlinkClick r:id="rId4"/>
-              </a:rPr>
-              <a:t>-team-</a:t>
-            </a:r>
-            <a:r>
-              <a:rPr lang="en-US" dirty="0" err="1">
-                <a:hlinkClick r:id="rId4"/>
-              </a:rPr>
-              <a:t>houston.herokuapp.com</a:t>
-            </a:r>
-            <a:r>
-              <a:rPr lang="en-US" dirty="0">
-                <a:hlinkClick r:id="rId4"/>
-              </a:rPr>
-              <a:t>/</a:t>
-            </a:r>
-            <a:endParaRPr lang="en-US" dirty="0"/>
+        <p:spPr/>
+        <p:txBody>
+          <a:bodyPr/>
+          <a:lstStyle/>
+          <a:p>
+            <a:endParaRPr lang="en-US"/>
           </a:p>
         </p:txBody>
       </p:sp>
     </p:spTree>
     <p:extLst>
       <p:ext uri="{BB962C8B-B14F-4D97-AF65-F5344CB8AC3E}">
-        <p14:creationId xmlns:p14="http://schemas.microsoft.com/office/powerpoint/2010/main" val="2209031246"/>
+        <p14:creationId xmlns:p14="http://schemas.microsoft.com/office/powerpoint/2010/main" val="1654850993"/>
       </p:ext>
     </p:extLst>
   </p:cSld>
   <p:clrMapOvr>
     <a:masterClrMapping/>
   </p:clrMapOvr>
+  <p:timing>
+    <p:tnLst>
+      <p:par>
+        <p:cTn id="1" dur="indefinite" restart="never" nodeType="tmRoot"/>
+      </p:par>
+    </p:tnLst>
+  </p:timing>
 </p:sld>
 </file>
 
@@ -4351,12 +4406,30 @@
             <p:ph type="title"/>
           </p:nvPr>
         </p:nvSpPr>
-        <p:spPr>
-          <a:xfrm>
-            <a:off x="457200" y="2779250"/>
-            <a:ext cx="8229600" cy="1143000"/>
-          </a:xfrm>
-        </p:spPr>
+        <p:spPr/>
+        <p:txBody>
+          <a:bodyPr/>
+          <a:lstStyle/>
+          <a:p>
+            <a:r>
+              <a:rPr lang="en-US" dirty="0" smtClean="0"/>
+              <a:t>Use Cases</a:t>
+            </a:r>
+            <a:endParaRPr lang="en-US" dirty="0"/>
+          </a:p>
+        </p:txBody>
+      </p:sp>
+      <p:sp>
+        <p:nvSpPr>
+          <p:cNvPr id="3" name="Content Placeholder 2"/>
+          <p:cNvSpPr>
+            <a:spLocks noGrp="1"/>
+          </p:cNvSpPr>
+          <p:nvPr>
+            <p:ph idx="1"/>
+          </p:nvPr>
+        </p:nvSpPr>
+        <p:spPr/>
         <p:txBody>
           <a:bodyPr>
             <a:normAutofit/>
@@ -4365,22 +4438,578 @@
           <a:p>
             <a:r>
               <a:rPr lang="en-US" dirty="0" smtClean="0"/>
-              <a:t>	Questions?</a:t>
+              <a:t>Pacman</a:t>
             </a:r>
             <a:endParaRPr lang="en-US" dirty="0"/>
+          </a:p>
+          <a:p>
+            <a:pPr lvl="1" fontAlgn="base"/>
+            <a:r>
+              <a:rPr lang="en-US" dirty="0"/>
+              <a:t>Pacman can move in all directions - can change direction with user input</a:t>
+            </a:r>
+          </a:p>
+          <a:p>
+            <a:pPr lvl="1" fontAlgn="base"/>
+            <a:r>
+              <a:rPr lang="en-US" dirty="0"/>
+              <a:t>Pacman does not go through walls</a:t>
+            </a:r>
+          </a:p>
+          <a:p>
+            <a:pPr lvl="1" fontAlgn="base"/>
+            <a:r>
+              <a:rPr lang="en-US" dirty="0"/>
+              <a:t>Pacman can teleport through </a:t>
+            </a:r>
+            <a:r>
+              <a:rPr lang="en-US" dirty="0" smtClean="0"/>
+              <a:t>exit</a:t>
+            </a:r>
+            <a:r>
+              <a:rPr lang="en-US" altLang="zh-CN" dirty="0" smtClean="0"/>
+              <a:t>s</a:t>
+            </a:r>
+            <a:endParaRPr lang="en-US" dirty="0"/>
+          </a:p>
+          <a:p>
+            <a:pPr lvl="1" fontAlgn="base"/>
+            <a:r>
+              <a:rPr lang="en-US" dirty="0"/>
+              <a:t>Pacman eats food - food is destroyed, update score, ghost strategy</a:t>
+            </a:r>
+          </a:p>
+          <a:p>
+            <a:pPr lvl="1" fontAlgn="base"/>
+            <a:r>
+              <a:rPr lang="en-US" dirty="0"/>
+              <a:t>Pacman eats afraid ghosts</a:t>
+            </a:r>
           </a:p>
         </p:txBody>
       </p:sp>
     </p:spTree>
     <p:extLst>
       <p:ext uri="{BB962C8B-B14F-4D97-AF65-F5344CB8AC3E}">
-        <p14:creationId xmlns:p14="http://schemas.microsoft.com/office/powerpoint/2010/main" val="2591834153"/>
+        <p14:creationId xmlns:p14="http://schemas.microsoft.com/office/powerpoint/2010/main" val="2761579830"/>
       </p:ext>
     </p:extLst>
   </p:cSld>
   <p:clrMapOvr>
     <a:masterClrMapping/>
   </p:clrMapOvr>
+  <p:timing>
+    <p:tnLst>
+      <p:par>
+        <p:cTn id="1" dur="indefinite" restart="never" nodeType="tmRoot"/>
+      </p:par>
+    </p:tnLst>
+  </p:timing>
+</p:sld>
+</file>
+
+<file path=ppt/slides/slide12.xml><?xml version="1.0" encoding="utf-8"?>
+<p:sld xmlns:a="http://schemas.openxmlformats.org/drawingml/2006/main" xmlns:r="http://schemas.openxmlformats.org/officeDocument/2006/relationships" xmlns:p="http://schemas.openxmlformats.org/presentationml/2006/main">
+  <p:cSld>
+    <p:spTree>
+      <p:nvGrpSpPr>
+        <p:cNvPr id="1" name=""/>
+        <p:cNvGrpSpPr/>
+        <p:nvPr/>
+      </p:nvGrpSpPr>
+      <p:grpSpPr>
+        <a:xfrm>
+          <a:off x="0" y="0"/>
+          <a:ext cx="0" cy="0"/>
+          <a:chOff x="0" y="0"/>
+          <a:chExt cx="0" cy="0"/>
+        </a:xfrm>
+      </p:grpSpPr>
+      <p:sp>
+        <p:nvSpPr>
+          <p:cNvPr id="2" name="Title 1"/>
+          <p:cNvSpPr>
+            <a:spLocks noGrp="1"/>
+          </p:cNvSpPr>
+          <p:nvPr>
+            <p:ph type="title"/>
+          </p:nvPr>
+        </p:nvSpPr>
+        <p:spPr/>
+        <p:txBody>
+          <a:bodyPr/>
+          <a:lstStyle/>
+          <a:p>
+            <a:r>
+              <a:rPr lang="en-US" dirty="0" smtClean="0"/>
+              <a:t>Use Cases</a:t>
+            </a:r>
+            <a:endParaRPr lang="en-US" dirty="0"/>
+          </a:p>
+        </p:txBody>
+      </p:sp>
+      <p:sp>
+        <p:nvSpPr>
+          <p:cNvPr id="3" name="Content Placeholder 2"/>
+          <p:cNvSpPr>
+            <a:spLocks noGrp="1"/>
+          </p:cNvSpPr>
+          <p:nvPr>
+            <p:ph idx="1"/>
+          </p:nvPr>
+        </p:nvSpPr>
+        <p:spPr/>
+        <p:txBody>
+          <a:bodyPr/>
+          <a:lstStyle/>
+          <a:p>
+            <a:r>
+              <a:rPr lang="en-US" dirty="0" smtClean="0"/>
+              <a:t>Ghosts</a:t>
+            </a:r>
+          </a:p>
+          <a:p>
+            <a:pPr lvl="1" fontAlgn="base"/>
+            <a:r>
+              <a:rPr lang="en-US" dirty="0"/>
+              <a:t>Ghost starts in jail</a:t>
+            </a:r>
+          </a:p>
+          <a:p>
+            <a:pPr lvl="1" fontAlgn="base"/>
+            <a:r>
+              <a:rPr lang="en-US" dirty="0"/>
+              <a:t>Ghost can move based on strategy</a:t>
+            </a:r>
+          </a:p>
+          <a:p>
+            <a:pPr lvl="1" fontAlgn="base"/>
+            <a:r>
+              <a:rPr lang="en-US" dirty="0"/>
+              <a:t>Ghost does not go through walls</a:t>
+            </a:r>
+          </a:p>
+          <a:p>
+            <a:pPr lvl="1" fontAlgn="base"/>
+            <a:r>
+              <a:rPr lang="en-US" dirty="0"/>
+              <a:t>Ghost can teleport through exit</a:t>
+            </a:r>
+          </a:p>
+          <a:p>
+            <a:pPr lvl="1" fontAlgn="base"/>
+            <a:r>
+              <a:rPr lang="en-US" dirty="0"/>
+              <a:t>Eating large dot makes ghosts afraid</a:t>
+            </a:r>
+          </a:p>
+          <a:p>
+            <a:pPr lvl="1" fontAlgn="base"/>
+            <a:r>
+              <a:rPr lang="en-US" dirty="0"/>
+              <a:t>Ghost goes to jail when eaten</a:t>
+            </a:r>
+          </a:p>
+        </p:txBody>
+      </p:sp>
+    </p:spTree>
+    <p:extLst>
+      <p:ext uri="{BB962C8B-B14F-4D97-AF65-F5344CB8AC3E}">
+        <p14:creationId xmlns:p14="http://schemas.microsoft.com/office/powerpoint/2010/main" val="3923475606"/>
+      </p:ext>
+    </p:extLst>
+  </p:cSld>
+  <p:clrMapOvr>
+    <a:masterClrMapping/>
+  </p:clrMapOvr>
+</p:sld>
+</file>
+
+<file path=ppt/slides/slide13.xml><?xml version="1.0" encoding="utf-8"?>
+<p:sld xmlns:a="http://schemas.openxmlformats.org/drawingml/2006/main" xmlns:r="http://schemas.openxmlformats.org/officeDocument/2006/relationships" xmlns:p="http://schemas.openxmlformats.org/presentationml/2006/main">
+  <p:cSld>
+    <p:spTree>
+      <p:nvGrpSpPr>
+        <p:cNvPr id="1" name=""/>
+        <p:cNvGrpSpPr/>
+        <p:nvPr/>
+      </p:nvGrpSpPr>
+      <p:grpSpPr>
+        <a:xfrm>
+          <a:off x="0" y="0"/>
+          <a:ext cx="0" cy="0"/>
+          <a:chOff x="0" y="0"/>
+          <a:chExt cx="0" cy="0"/>
+        </a:xfrm>
+      </p:grpSpPr>
+      <p:sp>
+        <p:nvSpPr>
+          <p:cNvPr id="2" name="Title 1"/>
+          <p:cNvSpPr>
+            <a:spLocks noGrp="1"/>
+          </p:cNvSpPr>
+          <p:nvPr>
+            <p:ph type="title"/>
+          </p:nvPr>
+        </p:nvSpPr>
+        <p:spPr/>
+        <p:txBody>
+          <a:bodyPr/>
+          <a:lstStyle/>
+          <a:p>
+            <a:r>
+              <a:rPr lang="en-US" dirty="0" smtClean="0"/>
+              <a:t>Use Cases</a:t>
+            </a:r>
+            <a:endParaRPr lang="en-US" dirty="0"/>
+          </a:p>
+        </p:txBody>
+      </p:sp>
+      <p:sp>
+        <p:nvSpPr>
+          <p:cNvPr id="3" name="Content Placeholder 2"/>
+          <p:cNvSpPr>
+            <a:spLocks noGrp="1"/>
+          </p:cNvSpPr>
+          <p:nvPr>
+            <p:ph idx="1"/>
+          </p:nvPr>
+        </p:nvSpPr>
+        <p:spPr/>
+        <p:txBody>
+          <a:bodyPr/>
+          <a:lstStyle/>
+          <a:p>
+            <a:r>
+              <a:rPr lang="en-US" dirty="0" smtClean="0"/>
+              <a:t>Game</a:t>
+            </a:r>
+          </a:p>
+          <a:p>
+            <a:pPr lvl="1"/>
+            <a:r>
+              <a:rPr lang="en-US" dirty="0" smtClean="0"/>
+              <a:t>Spawn fruit periodically</a:t>
+            </a:r>
+          </a:p>
+          <a:p>
+            <a:pPr lvl="1"/>
+            <a:r>
+              <a:rPr lang="en-US" dirty="0" smtClean="0"/>
+              <a:t>End game on win/lose condition</a:t>
+            </a:r>
+          </a:p>
+        </p:txBody>
+      </p:sp>
+    </p:spTree>
+    <p:extLst>
+      <p:ext uri="{BB962C8B-B14F-4D97-AF65-F5344CB8AC3E}">
+        <p14:creationId xmlns:p14="http://schemas.microsoft.com/office/powerpoint/2010/main" val="1314568207"/>
+      </p:ext>
+    </p:extLst>
+  </p:cSld>
+  <p:clrMapOvr>
+    <a:masterClrMapping/>
+  </p:clrMapOvr>
+</p:sld>
+</file>
+
+<file path=ppt/slides/slide14.xml><?xml version="1.0" encoding="utf-8"?>
+<p:sld xmlns:a="http://schemas.openxmlformats.org/drawingml/2006/main" xmlns:r="http://schemas.openxmlformats.org/officeDocument/2006/relationships" xmlns:p="http://schemas.openxmlformats.org/presentationml/2006/main">
+  <p:cSld>
+    <p:spTree>
+      <p:nvGrpSpPr>
+        <p:cNvPr id="1" name=""/>
+        <p:cNvGrpSpPr/>
+        <p:nvPr/>
+      </p:nvGrpSpPr>
+      <p:grpSpPr>
+        <a:xfrm>
+          <a:off x="0" y="0"/>
+          <a:ext cx="0" cy="0"/>
+          <a:chOff x="0" y="0"/>
+          <a:chExt cx="0" cy="0"/>
+        </a:xfrm>
+      </p:grpSpPr>
+      <p:sp>
+        <p:nvSpPr>
+          <p:cNvPr id="2" name="Title 1"/>
+          <p:cNvSpPr>
+            <a:spLocks noGrp="1"/>
+          </p:cNvSpPr>
+          <p:nvPr>
+            <p:ph type="title"/>
+          </p:nvPr>
+        </p:nvSpPr>
+        <p:spPr/>
+        <p:txBody>
+          <a:bodyPr/>
+          <a:lstStyle/>
+          <a:p>
+            <a:r>
+              <a:rPr lang="en-US" dirty="0" smtClean="0"/>
+              <a:t>API Breakdown</a:t>
+            </a:r>
+            <a:endParaRPr lang="en-US" dirty="0"/>
+          </a:p>
+        </p:txBody>
+      </p:sp>
+      <p:sp>
+        <p:nvSpPr>
+          <p:cNvPr id="3" name="Content Placeholder 2"/>
+          <p:cNvSpPr>
+            <a:spLocks noGrp="1"/>
+          </p:cNvSpPr>
+          <p:nvPr>
+            <p:ph idx="1"/>
+          </p:nvPr>
+        </p:nvSpPr>
+        <p:spPr/>
+        <p:txBody>
+          <a:bodyPr/>
+          <a:lstStyle/>
+          <a:p>
+            <a:r>
+              <a:rPr lang="en-US" dirty="0" smtClean="0"/>
+              <a:t>Model </a:t>
+            </a:r>
+            <a:r>
+              <a:rPr lang="mr-IN" dirty="0" smtClean="0"/>
+              <a:t>–</a:t>
+            </a:r>
+            <a:r>
+              <a:rPr lang="en-US" dirty="0" smtClean="0"/>
+              <a:t> </a:t>
+            </a:r>
+            <a:r>
+              <a:rPr lang="en-US" dirty="0" err="1" smtClean="0"/>
+              <a:t>Cmds</a:t>
+            </a:r>
+            <a:r>
+              <a:rPr lang="en-US" dirty="0" smtClean="0"/>
+              <a:t>, Strategies, </a:t>
+            </a:r>
+            <a:r>
+              <a:rPr lang="en-US" dirty="0" err="1" smtClean="0"/>
+              <a:t>GameObjects</a:t>
+            </a:r>
+            <a:endParaRPr lang="en-US" dirty="0" smtClean="0"/>
+          </a:p>
+          <a:p>
+            <a:pPr lvl="1"/>
+            <a:r>
+              <a:rPr lang="en-US" dirty="0" smtClean="0"/>
+              <a:t>Interfaces and abstract classes</a:t>
+            </a:r>
+          </a:p>
+          <a:p>
+            <a:r>
+              <a:rPr lang="en-US" dirty="0" err="1" smtClean="0"/>
+              <a:t>DispatchAdapter</a:t>
+            </a:r>
+            <a:r>
+              <a:rPr lang="en-US" dirty="0" smtClean="0"/>
+              <a:t>, Controller</a:t>
+            </a:r>
+          </a:p>
+          <a:p>
+            <a:pPr lvl="1"/>
+            <a:r>
+              <a:rPr lang="en-US" dirty="0" smtClean="0"/>
+              <a:t>Manage game, process requests</a:t>
+            </a:r>
+          </a:p>
+          <a:p>
+            <a:r>
+              <a:rPr lang="en-US" dirty="0" err="1" smtClean="0"/>
+              <a:t>View.js</a:t>
+            </a:r>
+            <a:r>
+              <a:rPr lang="en-US" dirty="0" smtClean="0"/>
+              <a:t>, </a:t>
+            </a:r>
+            <a:r>
+              <a:rPr lang="en-US" dirty="0" err="1" smtClean="0"/>
+              <a:t>Index.html</a:t>
+            </a:r>
+            <a:endParaRPr lang="en-US" dirty="0" smtClean="0"/>
+          </a:p>
+          <a:p>
+            <a:pPr lvl="1"/>
+            <a:r>
+              <a:rPr lang="en-US" dirty="0" smtClean="0"/>
+              <a:t>Display game objects, make requests</a:t>
+            </a:r>
+          </a:p>
+        </p:txBody>
+      </p:sp>
+    </p:spTree>
+    <p:extLst>
+      <p:ext uri="{BB962C8B-B14F-4D97-AF65-F5344CB8AC3E}">
+        <p14:creationId xmlns:p14="http://schemas.microsoft.com/office/powerpoint/2010/main" val="827146816"/>
+      </p:ext>
+    </p:extLst>
+  </p:cSld>
+  <p:clrMapOvr>
+    <a:masterClrMapping/>
+  </p:clrMapOvr>
+  <p:timing>
+    <p:tnLst>
+      <p:par>
+        <p:cTn id="1" dur="indefinite" restart="never" nodeType="tmRoot"/>
+      </p:par>
+    </p:tnLst>
+  </p:timing>
+</p:sld>
+</file>
+
+<file path=ppt/slides/slide15.xml><?xml version="1.0" encoding="utf-8"?>
+<p:sld xmlns:a="http://schemas.openxmlformats.org/drawingml/2006/main" xmlns:r="http://schemas.openxmlformats.org/officeDocument/2006/relationships" xmlns:p="http://schemas.openxmlformats.org/presentationml/2006/main">
+  <p:cSld>
+    <p:spTree>
+      <p:nvGrpSpPr>
+        <p:cNvPr id="1" name=""/>
+        <p:cNvGrpSpPr/>
+        <p:nvPr/>
+      </p:nvGrpSpPr>
+      <p:grpSpPr>
+        <a:xfrm>
+          <a:off x="0" y="0"/>
+          <a:ext cx="0" cy="0"/>
+          <a:chOff x="0" y="0"/>
+          <a:chExt cx="0" cy="0"/>
+        </a:xfrm>
+      </p:grpSpPr>
+      <p:sp>
+        <p:nvSpPr>
+          <p:cNvPr id="2" name="Title 1"/>
+          <p:cNvSpPr>
+            <a:spLocks noGrp="1"/>
+          </p:cNvSpPr>
+          <p:nvPr>
+            <p:ph type="title"/>
+          </p:nvPr>
+        </p:nvSpPr>
+        <p:spPr/>
+        <p:txBody>
+          <a:bodyPr/>
+          <a:lstStyle/>
+          <a:p>
+            <a:r>
+              <a:rPr lang="en-US" dirty="0" smtClean="0"/>
+              <a:t>Model </a:t>
+            </a:r>
+            <a:r>
+              <a:rPr lang="mr-IN" dirty="0" smtClean="0"/>
+              <a:t>–</a:t>
+            </a:r>
+            <a:r>
+              <a:rPr lang="en-US" dirty="0" smtClean="0"/>
+              <a:t> Commands, Strategies</a:t>
+            </a:r>
+            <a:endParaRPr lang="en-US" dirty="0"/>
+          </a:p>
+        </p:txBody>
+      </p:sp>
+      <p:sp>
+        <p:nvSpPr>
+          <p:cNvPr id="3" name="Content Placeholder 2"/>
+          <p:cNvSpPr>
+            <a:spLocks noGrp="1"/>
+          </p:cNvSpPr>
+          <p:nvPr>
+            <p:ph idx="1"/>
+          </p:nvPr>
+        </p:nvSpPr>
+        <p:spPr/>
+        <p:txBody>
+          <a:bodyPr/>
+          <a:lstStyle/>
+          <a:p>
+            <a:r>
+              <a:rPr lang="en-US" dirty="0" smtClean="0"/>
+              <a:t>Commands</a:t>
+            </a:r>
+          </a:p>
+          <a:p>
+            <a:pPr lvl="1"/>
+            <a:r>
+              <a:rPr lang="en-US" dirty="0" err="1" smtClean="0"/>
+              <a:t>IGameObjectCmd</a:t>
+            </a:r>
+            <a:endParaRPr lang="en-US" dirty="0" smtClean="0"/>
+          </a:p>
+          <a:p>
+            <a:r>
+              <a:rPr lang="en-US" dirty="0" smtClean="0"/>
+              <a:t>Strategies</a:t>
+            </a:r>
+          </a:p>
+          <a:p>
+            <a:pPr lvl="1"/>
+            <a:r>
+              <a:rPr lang="en-US" dirty="0" err="1" smtClean="0"/>
+              <a:t>IUpdateStrategy</a:t>
+            </a:r>
+            <a:r>
+              <a:rPr lang="en-US" dirty="0" smtClean="0"/>
+              <a:t> </a:t>
+            </a:r>
+            <a:r>
+              <a:rPr lang="mr-IN" dirty="0" smtClean="0"/>
+              <a:t>–</a:t>
+            </a:r>
+            <a:r>
+              <a:rPr lang="en-US" dirty="0" smtClean="0"/>
+              <a:t> move </a:t>
+            </a:r>
+            <a:r>
+              <a:rPr lang="en-US" dirty="0" err="1" smtClean="0"/>
+              <a:t>Pacman</a:t>
+            </a:r>
+            <a:r>
+              <a:rPr lang="en-US" dirty="0" smtClean="0"/>
+              <a:t> and ghosts</a:t>
+            </a:r>
+          </a:p>
+          <a:p>
+            <a:pPr lvl="1"/>
+            <a:r>
+              <a:rPr lang="en-US" dirty="0" err="1" smtClean="0"/>
+              <a:t>IInteractStrategy</a:t>
+            </a:r>
+            <a:r>
+              <a:rPr lang="en-US" dirty="0" smtClean="0"/>
+              <a:t> </a:t>
+            </a:r>
+            <a:r>
+              <a:rPr lang="mr-IN" dirty="0" smtClean="0"/>
+              <a:t>–</a:t>
+            </a:r>
+            <a:r>
+              <a:rPr lang="en-US" dirty="0" smtClean="0"/>
+              <a:t> one-directional interactions</a:t>
+            </a:r>
+          </a:p>
+        </p:txBody>
+      </p:sp>
+    </p:spTree>
+    <p:extLst>
+      <p:ext uri="{BB962C8B-B14F-4D97-AF65-F5344CB8AC3E}">
+        <p14:creationId xmlns:p14="http://schemas.microsoft.com/office/powerpoint/2010/main" val="354699675"/>
+      </p:ext>
+    </p:extLst>
+  </p:cSld>
+  <p:clrMapOvr>
+    <a:masterClrMapping/>
+  </p:clrMapOvr>
+  <p:timing>
+    <p:tnLst>
+      <p:par>
+        <p:cTn id="1" dur="indefinite" restart="never" nodeType="tmRoot"/>
+      </p:par>
+    </p:tnLst>
+  </p:timing>
 </p:sld>
 </file>
 
@@ -4417,8 +5046,16 @@
           <a:lstStyle/>
           <a:p>
             <a:r>
-              <a:rPr lang="en-US" dirty="0" smtClean="0"/>
-              <a:t>Use Cases</a:t>
+              <a:rPr lang="en-US" altLang="zh-CN" dirty="0" smtClean="0"/>
+              <a:t>Design</a:t>
+            </a:r>
+            <a:r>
+              <a:rPr lang="zh-CN" altLang="en-US" dirty="0" smtClean="0"/>
+              <a:t> </a:t>
+            </a:r>
+            <a:r>
+              <a:rPr lang="en-US" altLang="zh-CN" dirty="0" smtClean="0"/>
+              <a:t>Overview</a:t>
             </a:r>
             <a:endParaRPr lang="en-US" dirty="0"/>
           </a:p>
@@ -4440,51 +5077,177 @@
           <a:lstStyle/>
           <a:p>
             <a:r>
-              <a:rPr lang="en-US" dirty="0" smtClean="0"/>
-              <a:t>Game</a:t>
+              <a:rPr lang="en-US" altLang="zh-CN" dirty="0" smtClean="0"/>
+              <a:t>Command</a:t>
+            </a:r>
+            <a:r>
+              <a:rPr lang="zh-CN" altLang="en-US" dirty="0" smtClean="0"/>
+              <a:t> </a:t>
+            </a:r>
+            <a:r>
+              <a:rPr lang="en-US" altLang="zh-CN" dirty="0" smtClean="0"/>
+              <a:t>design</a:t>
+            </a:r>
+            <a:r>
+              <a:rPr lang="zh-CN" altLang="en-US" dirty="0" smtClean="0"/>
+              <a:t> </a:t>
+            </a:r>
+            <a:r>
+              <a:rPr lang="en-US" altLang="zh-CN" dirty="0" smtClean="0"/>
+              <a:t>pattern</a:t>
             </a:r>
           </a:p>
           <a:p>
             <a:pPr lvl="1"/>
             <a:r>
-              <a:rPr lang="en-US" dirty="0" smtClean="0"/>
-              <a:t>Display all game objects</a:t>
+              <a:rPr lang="en-US" altLang="zh-CN" dirty="0" smtClean="0"/>
+              <a:t>For</a:t>
+            </a:r>
+            <a:r>
+              <a:rPr lang="zh-CN" altLang="en-US" dirty="0" smtClean="0"/>
+              <a:t> </a:t>
+            </a:r>
+            <a:r>
+              <a:rPr lang="en-US" altLang="zh-CN" dirty="0" smtClean="0"/>
+              <a:t>the</a:t>
+            </a:r>
+            <a:r>
+              <a:rPr lang="zh-CN" altLang="en-US" dirty="0" smtClean="0"/>
+              <a:t> </a:t>
+            </a:r>
+            <a:r>
+              <a:rPr lang="en-US" altLang="zh-CN" dirty="0" smtClean="0"/>
+              <a:t>overall</a:t>
+            </a:r>
+            <a:r>
+              <a:rPr lang="zh-CN" altLang="en-US" dirty="0" smtClean="0"/>
+              <a:t> </a:t>
+            </a:r>
+            <a:r>
+              <a:rPr lang="en-US" altLang="zh-CN" dirty="0" smtClean="0"/>
+              <a:t>game</a:t>
+            </a:r>
+            <a:r>
+              <a:rPr lang="zh-CN" altLang="en-US" dirty="0" smtClean="0"/>
+              <a:t> </a:t>
+            </a:r>
+            <a:r>
+              <a:rPr lang="en-US" altLang="zh-CN" dirty="0" smtClean="0"/>
+              <a:t>design</a:t>
+            </a:r>
+          </a:p>
+          <a:p>
+            <a:r>
+              <a:rPr lang="en-US" altLang="zh-CN" dirty="0" smtClean="0"/>
+              <a:t>Singleton</a:t>
+            </a:r>
+            <a:r>
+              <a:rPr lang="zh-CN" altLang="en-US" dirty="0" smtClean="0"/>
+              <a:t> </a:t>
+            </a:r>
+            <a:r>
+              <a:rPr lang="en-US" altLang="zh-CN" dirty="0" smtClean="0"/>
+              <a:t>design</a:t>
+            </a:r>
+            <a:r>
+              <a:rPr lang="zh-CN" altLang="en-US" dirty="0" smtClean="0"/>
+              <a:t> </a:t>
+            </a:r>
+            <a:r>
+              <a:rPr lang="en-US" altLang="zh-CN" dirty="0" smtClean="0"/>
+              <a:t>pattern</a:t>
             </a:r>
           </a:p>
           <a:p>
             <a:pPr lvl="1"/>
             <a:r>
-              <a:rPr lang="en-US" dirty="0" smtClean="0"/>
-              <a:t>Spawn fruit periodically</a:t>
-            </a:r>
+              <a:rPr lang="en-US" altLang="zh-CN" dirty="0" smtClean="0"/>
+              <a:t>For</a:t>
+            </a:r>
+            <a:r>
+              <a:rPr lang="zh-CN" altLang="en-US" dirty="0" smtClean="0"/>
+              <a:t> </a:t>
+            </a:r>
+            <a:r>
+              <a:rPr lang="en-US" altLang="zh-CN" dirty="0" smtClean="0"/>
+              <a:t>the</a:t>
+            </a:r>
+            <a:r>
+              <a:rPr lang="zh-CN" altLang="en-US" dirty="0" smtClean="0"/>
+              <a:t> </a:t>
+            </a:r>
+            <a:r>
+              <a:rPr lang="en-US" altLang="zh-CN" dirty="0" err="1" smtClean="0"/>
+              <a:t>pacman</a:t>
+            </a:r>
+            <a:endParaRPr lang="en-US" altLang="zh-CN" dirty="0" smtClean="0"/>
           </a:p>
           <a:p>
             <a:pPr lvl="1"/>
             <a:r>
-              <a:rPr lang="en-US" dirty="0" smtClean="0"/>
-              <a:t>End game on win/lose condition</a:t>
-            </a:r>
-          </a:p>
-          <a:p>
-            <a:pPr lvl="1"/>
-            <a:r>
-              <a:rPr lang="en-US" dirty="0" smtClean="0"/>
-              <a:t>Track score, lives, timers, etc.</a:t>
-            </a:r>
-            <a:endParaRPr lang="en-US" dirty="0"/>
+              <a:rPr lang="en-US" altLang="zh-CN" dirty="0" smtClean="0"/>
+              <a:t>For</a:t>
+            </a:r>
+            <a:r>
+              <a:rPr lang="zh-CN" altLang="en-US" dirty="0" smtClean="0"/>
+              <a:t> </a:t>
+            </a:r>
+            <a:r>
+              <a:rPr lang="en-US" altLang="zh-CN" dirty="0" smtClean="0"/>
+              <a:t>c</a:t>
+            </a:r>
+            <a:r>
+              <a:rPr lang="en-US" altLang="zh-CN" dirty="0" smtClean="0"/>
+              <a:t>oncrete</a:t>
+            </a:r>
+            <a:r>
+              <a:rPr lang="zh-CN" altLang="en-US" dirty="0" smtClean="0"/>
+              <a:t> </a:t>
+            </a:r>
+            <a:r>
+              <a:rPr lang="en-US" altLang="zh-CN" dirty="0" smtClean="0"/>
+              <a:t>strategies</a:t>
+            </a:r>
+            <a:r>
+              <a:rPr lang="zh-CN" altLang="en-US" dirty="0" smtClean="0"/>
+              <a:t> </a:t>
+            </a:r>
+            <a:r>
+              <a:rPr lang="en-US" altLang="zh-CN" dirty="0" smtClean="0"/>
+              <a:t>and</a:t>
+            </a:r>
+            <a:r>
+              <a:rPr lang="zh-CN" altLang="en-US" dirty="0" smtClean="0"/>
+              <a:t> </a:t>
+            </a:r>
+            <a:r>
+              <a:rPr lang="en-US" altLang="zh-CN" dirty="0" smtClean="0"/>
+              <a:t>commands</a:t>
+            </a:r>
+            <a:endParaRPr lang="en-US" altLang="zh-CN" dirty="0"/>
+          </a:p>
+          <a:p>
+            <a:endParaRPr lang="en-US" altLang="zh-CN" dirty="0" smtClean="0"/>
           </a:p>
         </p:txBody>
       </p:sp>
     </p:spTree>
     <p:extLst>
       <p:ext uri="{BB962C8B-B14F-4D97-AF65-F5344CB8AC3E}">
-        <p14:creationId xmlns:p14="http://schemas.microsoft.com/office/powerpoint/2010/main" val="1314568207"/>
+        <p14:creationId xmlns:p14="http://schemas.microsoft.com/office/powerpoint/2010/main" val="1235365097"/>
       </p:ext>
     </p:extLst>
   </p:cSld>
   <p:clrMapOvr>
     <a:masterClrMapping/>
   </p:clrMapOvr>
+  <p:timing>
+    <p:tnLst>
+      <p:par>
+        <p:cTn id="1" dur="indefinite" restart="never" nodeType="tmRoot"/>
+      </p:par>
+    </p:tnLst>
+  </p:timing>
 </p:sld>
 </file>
 
@@ -4515,22 +5278,57 @@
             <p:ph type="title"/>
           </p:nvPr>
         </p:nvSpPr>
-        <p:spPr/>
+        <p:spPr>
+          <a:xfrm>
+            <a:off x="457200" y="274638"/>
+            <a:ext cx="8229600" cy="777548"/>
+          </a:xfrm>
+        </p:spPr>
         <p:txBody>
           <a:bodyPr/>
           <a:lstStyle/>
           <a:p>
             <a:r>
               <a:rPr lang="en-US" dirty="0" smtClean="0"/>
-              <a:t>Use Cases</a:t>
+              <a:t>API Overview</a:t>
             </a:r>
             <a:endParaRPr lang="en-US" dirty="0"/>
           </a:p>
         </p:txBody>
       </p:sp>
-      <p:sp>
-        <p:nvSpPr>
-          <p:cNvPr id="3" name="Content Placeholder 2"/>
+      <p:pic>
+        <p:nvPicPr>
+          <p:cNvPr id="4" name="Picture 3"/>
+          <p:cNvPicPr>
+            <a:picLocks noChangeAspect="1"/>
+          </p:cNvPicPr>
+          <p:nvPr/>
+        </p:nvPicPr>
+        <p:blipFill>
+          <a:blip r:embed="rId3">
+            <a:extLst>
+              <a:ext uri="{28A0092B-C50C-407E-A947-70E740481C1C}">
+                <a14:useLocalDpi xmlns:a14="http://schemas.microsoft.com/office/drawing/2010/main" val="0"/>
+              </a:ext>
+            </a:extLst>
+          </a:blip>
+          <a:stretch>
+            <a:fillRect/>
+          </a:stretch>
+        </p:blipFill>
+        <p:spPr>
+          <a:xfrm>
+            <a:off x="228600" y="1052186"/>
+            <a:ext cx="8686800" cy="3339070"/>
+          </a:xfrm>
+          <a:prstGeom prst="rect">
+            <a:avLst/>
+          </a:prstGeom>
+        </p:spPr>
+      </p:pic>
+      <p:sp>
+        <p:nvSpPr>
+          <p:cNvPr id="5" name="Content Placeholder 2"/>
           <p:cNvSpPr>
             <a:spLocks noGrp="1"/>
           </p:cNvSpPr>
@@ -4538,43 +5336,21 @@
             <p:ph idx="1"/>
           </p:nvPr>
         </p:nvSpPr>
-        <p:spPr/>
-        <p:txBody>
-          <a:bodyPr/>
-          <a:lstStyle/>
-          <a:p>
-            <a:r>
-              <a:rPr lang="en-US" dirty="0" err="1" smtClean="0"/>
-              <a:t>Pacman</a:t>
-            </a:r>
-            <a:endParaRPr lang="en-US" dirty="0" smtClean="0"/>
-          </a:p>
-          <a:p>
-            <a:pPr lvl="1"/>
+        <p:spPr>
+          <a:xfrm>
+            <a:off x="457200" y="4546948"/>
+            <a:ext cx="8229600" cy="2179529"/>
+          </a:xfrm>
+        </p:spPr>
+        <p:txBody>
+          <a:bodyPr>
+            <a:normAutofit fontScale="77500" lnSpcReduction="20000"/>
+          </a:bodyPr>
+          <a:lstStyle/>
+          <a:p>
             <a:r>
               <a:rPr lang="en-US" dirty="0" smtClean="0"/>
-              <a:t>Move in all direction based on user input</a:t>
-            </a:r>
-          </a:p>
-          <a:p>
-            <a:pPr lvl="1"/>
-            <a:r>
-              <a:rPr lang="en-US" dirty="0" smtClean="0"/>
-              <a:t>Does not go through walls</a:t>
-            </a:r>
-          </a:p>
-          <a:p>
-            <a:pPr lvl="1"/>
-            <a:r>
-              <a:rPr lang="en-US" dirty="0" smtClean="0"/>
-              <a:t>Warp through exit</a:t>
-            </a:r>
-          </a:p>
-          <a:p>
-            <a:pPr lvl="1"/>
-            <a:r>
-              <a:rPr lang="en-US" dirty="0" smtClean="0"/>
-              <a:t>Eat food </a:t>
+              <a:t>Model </a:t>
             </a:r>
             <a:r>
               <a:rPr lang="mr-IN" dirty="0" smtClean="0"/>
@@ -4582,46 +5358,74 @@
             </a:r>
             <a:r>
               <a:rPr lang="en-US" dirty="0" smtClean="0"/>
-              <a:t> destroy food, update score, update ghost strategy</a:t>
-            </a:r>
+              <a:t> </a:t>
+            </a:r>
+            <a:r>
+              <a:rPr lang="en-US" dirty="0" err="1" smtClean="0"/>
+              <a:t>Cmds</a:t>
+            </a:r>
+            <a:r>
+              <a:rPr lang="en-US" dirty="0" smtClean="0"/>
+              <a:t>, Strategies, </a:t>
+            </a:r>
+            <a:r>
+              <a:rPr lang="en-US" dirty="0" err="1" smtClean="0"/>
+              <a:t>GameObjects</a:t>
+            </a:r>
+            <a:endParaRPr lang="en-US" dirty="0" smtClean="0"/>
           </a:p>
           <a:p>
             <a:pPr lvl="1"/>
             <a:r>
               <a:rPr lang="en-US" dirty="0" smtClean="0"/>
-              <a:t>Eaten by ghosts </a:t>
-            </a:r>
-            <a:r>
-              <a:rPr lang="mr-IN" dirty="0" smtClean="0"/>
-              <a:t>–</a:t>
+              <a:t>Interfaces and abstract classes</a:t>
+            </a:r>
+          </a:p>
+          <a:p>
+            <a:r>
+              <a:rPr lang="en-US" dirty="0" err="1" smtClean="0"/>
+              <a:t>DispatchAdapter</a:t>
             </a:r>
             <a:r>
               <a:rPr lang="en-US" dirty="0" smtClean="0"/>
-              <a:t> lose life</a:t>
+              <a:t>, Controller</a:t>
             </a:r>
           </a:p>
           <a:p>
             <a:pPr lvl="1"/>
             <a:r>
               <a:rPr lang="en-US" dirty="0" smtClean="0"/>
-              <a:t>Eat afraid ghosts </a:t>
-            </a:r>
-            <a:r>
-              <a:rPr lang="mr-IN" dirty="0" smtClean="0"/>
-              <a:t>–</a:t>
+              <a:t>Manage game, process requests</a:t>
+            </a:r>
+          </a:p>
+          <a:p>
+            <a:r>
+              <a:rPr lang="en-US" dirty="0" err="1" smtClean="0"/>
+              <a:t>View.js</a:t>
             </a:r>
             <a:r>
               <a:rPr lang="en-US" dirty="0" smtClean="0"/>
-              <a:t> send to jail, update score</a:t>
-            </a:r>
-            <a:endParaRPr lang="en-US" dirty="0"/>
+              <a:t>, </a:t>
+            </a:r>
+            <a:r>
+              <a:rPr lang="en-US" dirty="0" err="1" smtClean="0"/>
+              <a:t>Index.html</a:t>
+            </a:r>
+            <a:endParaRPr lang="en-US" dirty="0" smtClean="0"/>
+          </a:p>
+          <a:p>
+            <a:pPr lvl="1"/>
+            <a:r>
+              <a:rPr lang="en-US" dirty="0" smtClean="0"/>
+              <a:t>Display game objects, make requests</a:t>
+            </a:r>
           </a:p>
         </p:txBody>
       </p:sp>
     </p:spTree>
     <p:extLst>
       <p:ext uri="{BB962C8B-B14F-4D97-AF65-F5344CB8AC3E}">
-        <p14:creationId xmlns:p14="http://schemas.microsoft.com/office/powerpoint/2010/main" val="2761579830"/>
+        <p14:creationId xmlns:p14="http://schemas.microsoft.com/office/powerpoint/2010/main" val="489816454"/>
       </p:ext>
     </p:extLst>
   </p:cSld>
@@ -4664,74 +5468,68 @@
           <a:lstStyle/>
           <a:p>
             <a:r>
-              <a:rPr lang="en-US" dirty="0" smtClean="0"/>
-              <a:t>Use Cases</a:t>
+              <a:rPr lang="en-US" altLang="zh-CN" dirty="0" smtClean="0"/>
+              <a:t>Model—Commands,</a:t>
+            </a:r>
+            <a:r>
+              <a:rPr lang="zh-CN" altLang="en-US" dirty="0" smtClean="0"/>
+              <a:t> </a:t>
+            </a:r>
+            <a:r>
+              <a:rPr lang="en-US" altLang="zh-CN" dirty="0" smtClean="0"/>
+              <a:t>Strategies</a:t>
             </a:r>
             <a:endParaRPr lang="en-US" dirty="0"/>
           </a:p>
         </p:txBody>
       </p:sp>
-      <p:sp>
-        <p:nvSpPr>
-          <p:cNvPr id="3" name="Content Placeholder 2"/>
-          <p:cNvSpPr>
-            <a:spLocks noGrp="1"/>
-          </p:cNvSpPr>
-          <p:nvPr>
-            <p:ph idx="1"/>
-          </p:nvPr>
-        </p:nvSpPr>
-        <p:spPr/>
-        <p:txBody>
-          <a:bodyPr/>
-          <a:lstStyle/>
-          <a:p>
-            <a:r>
-              <a:rPr lang="en-US" dirty="0" smtClean="0"/>
-              <a:t>Ghosts</a:t>
-            </a:r>
-          </a:p>
-          <a:p>
-            <a:pPr lvl="1"/>
-            <a:r>
-              <a:rPr lang="en-US" dirty="0" smtClean="0"/>
-              <a:t>Move based on strategy</a:t>
-            </a:r>
-          </a:p>
-          <a:p>
-            <a:pPr lvl="1"/>
-            <a:r>
-              <a:rPr lang="en-US" dirty="0" smtClean="0"/>
-              <a:t>Does not go through walls</a:t>
-            </a:r>
-          </a:p>
-          <a:p>
-            <a:pPr lvl="1"/>
-            <a:r>
-              <a:rPr lang="en-US" dirty="0" smtClean="0"/>
-              <a:t>Warp through exit</a:t>
-            </a:r>
-          </a:p>
-          <a:p>
-            <a:pPr lvl="1"/>
-            <a:r>
-              <a:rPr lang="en-US" dirty="0" smtClean="0"/>
-              <a:t>Exit jail after some time</a:t>
-            </a:r>
-            <a:endParaRPr lang="en-US" dirty="0"/>
-          </a:p>
-        </p:txBody>
-      </p:sp>
+      <p:pic>
+        <p:nvPicPr>
+          <p:cNvPr id="4" name="Picture 3"/>
+          <p:cNvPicPr>
+            <a:picLocks noChangeAspect="1"/>
+          </p:cNvPicPr>
+          <p:nvPr/>
+        </p:nvPicPr>
+        <p:blipFill>
+          <a:blip r:embed="rId2">
+            <a:extLst>
+              <a:ext uri="{28A0092B-C50C-407E-A947-70E740481C1C}">
+                <a14:useLocalDpi xmlns:a14="http://schemas.microsoft.com/office/drawing/2010/main" val="0"/>
+              </a:ext>
+            </a:extLst>
+          </a:blip>
+          <a:stretch>
+            <a:fillRect/>
+          </a:stretch>
+        </p:blipFill>
+        <p:spPr>
+          <a:xfrm>
+            <a:off x="0" y="1250863"/>
+            <a:ext cx="9144000" cy="3431211"/>
+          </a:xfrm>
+          <a:prstGeom prst="rect">
+            <a:avLst/>
+          </a:prstGeom>
+        </p:spPr>
+      </p:pic>
     </p:spTree>
     <p:extLst>
       <p:ext uri="{BB962C8B-B14F-4D97-AF65-F5344CB8AC3E}">
-        <p14:creationId xmlns:p14="http://schemas.microsoft.com/office/powerpoint/2010/main" val="3923475606"/>
+        <p14:creationId xmlns:p14="http://schemas.microsoft.com/office/powerpoint/2010/main" val="2060030462"/>
       </p:ext>
     </p:extLst>
   </p:cSld>
   <p:clrMapOvr>
     <a:masterClrMapping/>
   </p:clrMapOvr>
+  <p:timing>
+    <p:tnLst>
+      <p:par>
+        <p:cTn id="1" dur="indefinite" restart="never" nodeType="tmRoot"/>
+      </p:par>
+    </p:tnLst>
+  </p:timing>
 </p:sld>
 </file>
 
@@ -4762,32 +5560,16 @@
             <p:ph type="title"/>
           </p:nvPr>
         </p:nvSpPr>
-        <p:spPr/>
-        <p:txBody>
-          <a:bodyPr/>
-          <a:lstStyle/>
-          <a:p>
-            <a:r>
-              <a:rPr lang="en-US" dirty="0" smtClean="0"/>
-              <a:t>API Breakdown</a:t>
-            </a:r>
-            <a:endParaRPr lang="en-US" dirty="0"/>
-          </a:p>
-        </p:txBody>
-      </p:sp>
-      <p:sp>
-        <p:nvSpPr>
-          <p:cNvPr id="3" name="Content Placeholder 2"/>
-          <p:cNvSpPr>
-            <a:spLocks noGrp="1"/>
-          </p:cNvSpPr>
-          <p:nvPr>
-            <p:ph idx="1"/>
-          </p:nvPr>
-        </p:nvSpPr>
-        <p:spPr/>
-        <p:txBody>
-          <a:bodyPr/>
+        <p:spPr>
+          <a:xfrm>
+            <a:off x="457200" y="274638"/>
+            <a:ext cx="8229600" cy="614710"/>
+          </a:xfrm>
+        </p:spPr>
+        <p:txBody>
+          <a:bodyPr>
+            <a:normAutofit fontScale="90000"/>
+          </a:bodyPr>
           <a:lstStyle/>
           <a:p>
             <a:r>
@@ -4804,85 +5586,53 @@
             </a:r>
             <a:r>
               <a:rPr lang="en-US" dirty="0" err="1" smtClean="0"/>
-              <a:t>Cmds</a:t>
-            </a:r>
-            <a:r>
-              <a:rPr lang="en-US" dirty="0" smtClean="0"/>
-              <a:t>, Strategies, </a:t>
-            </a:r>
-            <a:r>
-              <a:rPr lang="en-US" dirty="0" err="1" smtClean="0"/>
               <a:t>GameObjects</a:t>
             </a:r>
-            <a:endParaRPr lang="en-US" dirty="0" smtClean="0"/>
-          </a:p>
-          <a:p>
-            <a:pPr lvl="1"/>
-            <a:r>
-              <a:rPr lang="en-US" dirty="0" smtClean="0"/>
-              <a:t>Interfaces and abstract classes</a:t>
-            </a:r>
-          </a:p>
-          <a:p>
-            <a:r>
-              <a:rPr lang="en-US" dirty="0" err="1" smtClean="0"/>
-              <a:t>DispatchAdapter</a:t>
-            </a:r>
-            <a:r>
-              <a:rPr lang="en-US" dirty="0" smtClean="0"/>
-              <a:t>, Controller</a:t>
-            </a:r>
-          </a:p>
-          <a:p>
-            <a:pPr lvl="1"/>
-            <a:r>
-              <a:rPr lang="en-US" dirty="0" smtClean="0"/>
-              <a:t>Manage game, process requests</a:t>
-            </a:r>
-          </a:p>
-          <a:p>
-            <a:r>
-              <a:rPr lang="en-US" dirty="0" err="1" smtClean="0"/>
-              <a:t>View.js</a:t>
-            </a:r>
-            <a:r>
-              <a:rPr lang="en-US" dirty="0" smtClean="0"/>
-              <a:t>, </a:t>
-            </a:r>
-            <a:r>
-              <a:rPr lang="en-US" dirty="0" err="1" smtClean="0"/>
-              <a:t>Index.html</a:t>
-            </a:r>
-            <a:endParaRPr lang="en-US" dirty="0" smtClean="0"/>
-          </a:p>
-          <a:p>
-            <a:pPr lvl="1"/>
-            <a:r>
-              <a:rPr lang="en-US" dirty="0" smtClean="0"/>
-              <a:t>Display game objects, make requests</a:t>
-            </a:r>
-          </a:p>
-          <a:p>
-            <a:pPr marL="0" indent="0">
-              <a:buNone/>
-            </a:pPr>
-            <a:endParaRPr lang="en-US" dirty="0" smtClean="0"/>
-          </a:p>
-          <a:p>
             <a:endParaRPr lang="en-US" dirty="0"/>
           </a:p>
         </p:txBody>
       </p:sp>
+      <p:pic>
+        <p:nvPicPr>
+          <p:cNvPr id="3" name="Picture 2"/>
+          <p:cNvPicPr>
+            <a:picLocks noChangeAspect="1"/>
+          </p:cNvPicPr>
+          <p:nvPr/>
+        </p:nvPicPr>
+        <p:blipFill>
+          <a:blip r:embed="rId3"/>
+          <a:stretch>
+            <a:fillRect/>
+          </a:stretch>
+        </p:blipFill>
+        <p:spPr>
+          <a:xfrm>
+            <a:off x="807280" y="889348"/>
+            <a:ext cx="7879520" cy="5968652"/>
+          </a:xfrm>
+          <a:prstGeom prst="rect">
+            <a:avLst/>
+          </a:prstGeom>
+        </p:spPr>
+      </p:pic>
     </p:spTree>
     <p:extLst>
       <p:ext uri="{BB962C8B-B14F-4D97-AF65-F5344CB8AC3E}">
-        <p14:creationId xmlns:p14="http://schemas.microsoft.com/office/powerpoint/2010/main" val="2184818700"/>
+        <p14:creationId xmlns:p14="http://schemas.microsoft.com/office/powerpoint/2010/main" val="2696746514"/>
       </p:ext>
     </p:extLst>
   </p:cSld>
   <p:clrMapOvr>
     <a:masterClrMapping/>
   </p:clrMapOvr>
+  <p:timing>
+    <p:tnLst>
+      <p:par>
+        <p:cTn id="1" dur="indefinite" restart="never" nodeType="tmRoot"/>
+      </p:par>
+    </p:tnLst>
+  </p:timing>
 </p:sld>
 </file>
 
@@ -4919,107 +5669,77 @@
           <a:lstStyle/>
           <a:p>
             <a:r>
-              <a:rPr lang="en-US" dirty="0" smtClean="0"/>
-              <a:t>Model </a:t>
-            </a:r>
-            <a:r>
-              <a:rPr lang="mr-IN" dirty="0" smtClean="0"/>
-              <a:t>–</a:t>
-            </a:r>
-            <a:r>
-              <a:rPr lang="en-US" dirty="0" smtClean="0"/>
-              <a:t> Commands, Strategies</a:t>
+              <a:rPr lang="en-US" dirty="0" err="1" smtClean="0"/>
+              <a:t>DispatchAdapter</a:t>
             </a:r>
             <a:endParaRPr lang="en-US" dirty="0"/>
           </a:p>
         </p:txBody>
       </p:sp>
-      <p:sp>
-        <p:nvSpPr>
-          <p:cNvPr id="3" name="Content Placeholder 2"/>
-          <p:cNvSpPr>
-            <a:spLocks noGrp="1"/>
-          </p:cNvSpPr>
-          <p:nvPr>
-            <p:ph idx="1"/>
-          </p:nvPr>
-        </p:nvSpPr>
-        <p:spPr/>
-        <p:txBody>
-          <a:bodyPr/>
-          <a:lstStyle/>
-          <a:p>
-            <a:r>
-              <a:rPr lang="en-US" dirty="0" smtClean="0"/>
-              <a:t>Commands</a:t>
-            </a:r>
-          </a:p>
-          <a:p>
-            <a:pPr lvl="1"/>
-            <a:r>
-              <a:rPr lang="en-US" dirty="0" err="1" smtClean="0"/>
-              <a:t>IGameObjectCmd</a:t>
-            </a:r>
-            <a:endParaRPr lang="en-US" dirty="0" smtClean="0"/>
-          </a:p>
-          <a:p>
-            <a:r>
-              <a:rPr lang="en-US" dirty="0" smtClean="0"/>
-              <a:t>Strategies</a:t>
-            </a:r>
-          </a:p>
-          <a:p>
-            <a:pPr lvl="1"/>
-            <a:r>
-              <a:rPr lang="en-US" dirty="0" err="1" smtClean="0"/>
-              <a:t>IUpdateStrategy</a:t>
-            </a:r>
-            <a:r>
-              <a:rPr lang="en-US" dirty="0" smtClean="0"/>
-              <a:t> </a:t>
-            </a:r>
-            <a:r>
-              <a:rPr lang="mr-IN" dirty="0" smtClean="0"/>
-              <a:t>–</a:t>
-            </a:r>
-            <a:r>
-              <a:rPr lang="en-US" dirty="0" smtClean="0"/>
-              <a:t> move </a:t>
-            </a:r>
-            <a:r>
-              <a:rPr lang="en-US" dirty="0" err="1" smtClean="0"/>
-              <a:t>Pacman</a:t>
-            </a:r>
-            <a:r>
-              <a:rPr lang="en-US" dirty="0" smtClean="0"/>
-              <a:t> and ghosts</a:t>
-            </a:r>
-          </a:p>
-          <a:p>
-            <a:pPr lvl="1"/>
-            <a:r>
-              <a:rPr lang="en-US" dirty="0" err="1" smtClean="0"/>
-              <a:t>IInteractStrategy</a:t>
-            </a:r>
-            <a:r>
-              <a:rPr lang="en-US" dirty="0" smtClean="0"/>
-              <a:t> </a:t>
-            </a:r>
-            <a:r>
-              <a:rPr lang="mr-IN" dirty="0" smtClean="0"/>
-              <a:t>–</a:t>
-            </a:r>
-            <a:r>
-              <a:rPr lang="en-US" dirty="0" smtClean="0"/>
-              <a:t> one-directional interactions</a:t>
-            </a:r>
-          </a:p>
-        </p:txBody>
-      </p:sp>
+      <p:pic>
+        <p:nvPicPr>
+          <p:cNvPr id="3" name="Picture 2"/>
+          <p:cNvPicPr>
+            <a:picLocks noChangeAspect="1"/>
+          </p:cNvPicPr>
+          <p:nvPr/>
+        </p:nvPicPr>
+        <p:blipFill>
+          <a:blip r:embed="rId3">
+            <a:extLst>
+              <a:ext uri="{28A0092B-C50C-407E-A947-70E740481C1C}">
+                <a14:useLocalDpi xmlns:a14="http://schemas.microsoft.com/office/drawing/2010/main" val="0"/>
+              </a:ext>
+            </a:extLst>
+          </a:blip>
+          <a:stretch>
+            <a:fillRect/>
+          </a:stretch>
+        </p:blipFill>
+        <p:spPr>
+          <a:xfrm>
+            <a:off x="730908" y="1417638"/>
+            <a:ext cx="3022600" cy="1841500"/>
+          </a:xfrm>
+          <a:prstGeom prst="rect">
+            <a:avLst/>
+          </a:prstGeom>
+        </p:spPr>
+      </p:pic>
+      <p:pic>
+        <p:nvPicPr>
+          <p:cNvPr id="6" name="Picture 5"/>
+          <p:cNvPicPr>
+            <a:picLocks noChangeAspect="1"/>
+          </p:cNvPicPr>
+          <p:nvPr/>
+        </p:nvPicPr>
+        <p:blipFill>
+          <a:blip r:embed="rId4">
+            <a:extLst>
+              <a:ext uri="{28A0092B-C50C-407E-A947-70E740481C1C}">
+                <a14:useLocalDpi xmlns:a14="http://schemas.microsoft.com/office/drawing/2010/main" val="0"/>
+              </a:ext>
+            </a:extLst>
+          </a:blip>
+          <a:stretch>
+            <a:fillRect/>
+          </a:stretch>
+        </p:blipFill>
+        <p:spPr>
+          <a:xfrm>
+            <a:off x="5308600" y="1417638"/>
+            <a:ext cx="3378200" cy="4508500"/>
+          </a:xfrm>
+          <a:prstGeom prst="rect">
+            <a:avLst/>
+          </a:prstGeom>
+        </p:spPr>
+      </p:pic>
     </p:spTree>
     <p:extLst>
       <p:ext uri="{BB962C8B-B14F-4D97-AF65-F5344CB8AC3E}">
-        <p14:creationId xmlns:p14="http://schemas.microsoft.com/office/powerpoint/2010/main" val="3018462422"/>
+        <p14:creationId xmlns:p14="http://schemas.microsoft.com/office/powerpoint/2010/main" val="4037834688"/>
       </p:ext>
     </p:extLst>
   </p:cSld>
@@ -5070,7 +5790,41 @@
           <a:p>
             <a:r>
               <a:rPr lang="en-US" dirty="0" smtClean="0"/>
-              <a:t>Model </a:t>
+              <a:t>Controller</a:t>
+            </a:r>
+            <a:endParaRPr lang="en-US" dirty="0"/>
+          </a:p>
+        </p:txBody>
+      </p:sp>
+      <p:sp>
+        <p:nvSpPr>
+          <p:cNvPr id="3" name="Content Placeholder 2"/>
+          <p:cNvSpPr>
+            <a:spLocks noGrp="1"/>
+          </p:cNvSpPr>
+          <p:nvPr>
+            <p:ph idx="1"/>
+          </p:nvPr>
+        </p:nvSpPr>
+        <p:spPr/>
+        <p:txBody>
+          <a:bodyPr/>
+          <a:lstStyle/>
+          <a:p>
+            <a:r>
+              <a:rPr lang="en-US" dirty="0" smtClean="0"/>
+              <a:t>Supported requests</a:t>
+            </a:r>
+          </a:p>
+          <a:p>
+            <a:pPr lvl="1"/>
+            <a:r>
+              <a:rPr lang="en-US" dirty="0" err="1" smtClean="0"/>
+              <a:t>resetGame</a:t>
+            </a:r>
+            <a:r>
+              <a:rPr lang="en-US" dirty="0" smtClean="0"/>
+              <a:t> </a:t>
             </a:r>
             <a:r>
               <a:rPr lang="mr-IN" dirty="0" smtClean="0"/>
@@ -5078,44 +5832,62 @@
             </a:r>
             <a:r>
               <a:rPr lang="en-US" dirty="0" smtClean="0"/>
+              <a:t> get canvas dims and reset game objects </a:t>
+            </a:r>
+          </a:p>
+          <a:p>
+            <a:pPr lvl="1"/>
+            <a:r>
+              <a:rPr lang="en-US" dirty="0" err="1" smtClean="0"/>
+              <a:t>updateGame</a:t>
+            </a:r>
+            <a:r>
+              <a:rPr lang="en-US" dirty="0" smtClean="0"/>
               <a:t> </a:t>
             </a:r>
             <a:r>
+              <a:rPr lang="mr-IN" dirty="0" smtClean="0"/>
+              <a:t>–</a:t>
+            </a:r>
+            <a:r>
+              <a:rPr lang="en-US" dirty="0" smtClean="0"/>
+              <a:t> update game object states</a:t>
+            </a:r>
+          </a:p>
+          <a:p>
+            <a:pPr lvl="1"/>
+            <a:r>
               <a:rPr lang="en-US" dirty="0" err="1" smtClean="0"/>
-              <a:t>GameObjects</a:t>
-            </a:r>
-            <a:endParaRPr lang="en-US" dirty="0"/>
-          </a:p>
-        </p:txBody>
-      </p:sp>
-      <p:pic>
-        <p:nvPicPr>
-          <p:cNvPr id="4" name="Picture 3"/>
-          <p:cNvPicPr>
-            <a:picLocks noChangeAspect="1"/>
-          </p:cNvPicPr>
-          <p:nvPr/>
-        </p:nvPicPr>
-        <p:blipFill>
-          <a:blip r:embed="rId3"/>
-          <a:stretch>
-            <a:fillRect/>
-          </a:stretch>
-        </p:blipFill>
-        <p:spPr>
-          <a:xfrm>
-            <a:off x="1417067" y="1276342"/>
-            <a:ext cx="6298277" cy="5294097"/>
-          </a:xfrm>
-          <a:prstGeom prst="rect">
-            <a:avLst/>
-          </a:prstGeom>
-        </p:spPr>
-      </p:pic>
+              <a:t>switchDirection</a:t>
+            </a:r>
+            <a:r>
+              <a:rPr lang="en-US" dirty="0" smtClean="0"/>
+              <a:t> </a:t>
+            </a:r>
+            <a:r>
+              <a:rPr lang="mr-IN" dirty="0" smtClean="0"/>
+              <a:t>–</a:t>
+            </a:r>
+            <a:r>
+              <a:rPr lang="en-US" dirty="0" smtClean="0"/>
+              <a:t> switch </a:t>
+            </a:r>
+            <a:r>
+              <a:rPr lang="en-US" dirty="0" err="1" smtClean="0"/>
+              <a:t>Pacman</a:t>
+            </a:r>
+            <a:r>
+              <a:rPr lang="en-US" smtClean="0"/>
+              <a:t> direction</a:t>
+            </a:r>
+            <a:endParaRPr lang="en-US" dirty="0" smtClean="0"/>
+          </a:p>
+        </p:txBody>
+      </p:sp>
     </p:spTree>
     <p:extLst>
       <p:ext uri="{BB962C8B-B14F-4D97-AF65-F5344CB8AC3E}">
-        <p14:creationId xmlns:p14="http://schemas.microsoft.com/office/powerpoint/2010/main" val="2696746514"/>
+        <p14:creationId xmlns:p14="http://schemas.microsoft.com/office/powerpoint/2010/main" val="1459978361"/>
       </p:ext>
     </p:extLst>
   </p:cSld>
@@ -5165,8 +5937,8 @@
           <a:lstStyle/>
           <a:p>
             <a:r>
-              <a:rPr lang="en-US" dirty="0" err="1" smtClean="0"/>
-              <a:t>DispatchAdapter</a:t>
+              <a:rPr lang="en-US" dirty="0" smtClean="0"/>
+              <a:t>View</a:t>
             </a:r>
             <a:endParaRPr lang="en-US" dirty="0"/>
           </a:p>
@@ -5174,7 +5946,7 @@
       </p:sp>
       <p:pic>
         <p:nvPicPr>
-          <p:cNvPr id="4" name="Picture 3"/>
+          <p:cNvPr id="13" name="Picture 12"/>
           <p:cNvPicPr>
             <a:picLocks noChangeAspect="1"/>
           </p:cNvPicPr>
@@ -5188,42 +5960,72 @@
         </p:blipFill>
         <p:spPr>
           <a:xfrm>
-            <a:off x="1001308" y="1417638"/>
-            <a:ext cx="3044246" cy="3135391"/>
+            <a:off x="995637" y="2187564"/>
+            <a:ext cx="6985000" cy="4483100"/>
           </a:xfrm>
           <a:prstGeom prst="rect">
             <a:avLst/>
           </a:prstGeom>
         </p:spPr>
       </p:pic>
-      <p:pic>
-        <p:nvPicPr>
-          <p:cNvPr id="5" name="Picture 4"/>
-          <p:cNvPicPr>
-            <a:picLocks noChangeAspect="1"/>
-          </p:cNvPicPr>
-          <p:nvPr/>
-        </p:nvPicPr>
-        <p:blipFill>
-          <a:blip r:embed="rId4"/>
-          <a:stretch>
-            <a:fillRect/>
-          </a:stretch>
-        </p:blipFill>
+      <p:sp>
+        <p:nvSpPr>
+          <p:cNvPr id="14" name="Content Placeholder 2"/>
+          <p:cNvSpPr>
+            <a:spLocks noGrp="1"/>
+          </p:cNvSpPr>
+          <p:nvPr>
+            <p:ph idx="1"/>
+          </p:nvPr>
+        </p:nvSpPr>
         <p:spPr>
           <a:xfrm>
-            <a:off x="4806233" y="1417638"/>
-            <a:ext cx="3136900" cy="4699000"/>
+            <a:off x="457200" y="1600200"/>
+            <a:ext cx="8360336" cy="4525963"/>
           </a:xfrm>
-          <a:prstGeom prst="rect">
-            <a:avLst/>
-          </a:prstGeom>
         </p:spPr>
-      </p:pic>
+        <p:txBody>
+          <a:bodyPr/>
+          <a:lstStyle/>
+          <a:p>
+            <a:r>
+              <a:rPr lang="en-US" dirty="0">
+                <a:hlinkClick r:id="rId4"/>
+              </a:rPr>
+              <a:t>http://</a:t>
+            </a:r>
+            <a:r>
+              <a:rPr lang="en-US" dirty="0" err="1">
+                <a:hlinkClick r:id="rId4"/>
+              </a:rPr>
+              <a:t>pacman</a:t>
+            </a:r>
+            <a:r>
+              <a:rPr lang="en-US" dirty="0">
+                <a:hlinkClick r:id="rId4"/>
+              </a:rPr>
+              <a:t>-team-</a:t>
+            </a:r>
+            <a:r>
+              <a:rPr lang="en-US" dirty="0" err="1">
+                <a:hlinkClick r:id="rId4"/>
+              </a:rPr>
+              <a:t>houston.herokuapp.com</a:t>
+            </a:r>
+            <a:r>
+              <a:rPr lang="en-US" dirty="0">
+                <a:hlinkClick r:id="rId4"/>
+              </a:rPr>
+              <a:t>/</a:t>
+            </a:r>
+            <a:endParaRPr lang="en-US" dirty="0"/>
+          </a:p>
+        </p:txBody>
+      </p:sp>
     </p:spTree>
     <p:extLst>
       <p:ext uri="{BB962C8B-B14F-4D97-AF65-F5344CB8AC3E}">
-        <p14:creationId xmlns:p14="http://schemas.microsoft.com/office/powerpoint/2010/main" val="4037834688"/>
+        <p14:creationId xmlns:p14="http://schemas.microsoft.com/office/powerpoint/2010/main" val="2209031246"/>
       </p:ext>
     </p:extLst>
   </p:cSld>
@@ -5267,117 +6069,43 @@
             <p:ph type="title"/>
           </p:nvPr>
         </p:nvSpPr>
-        <p:spPr/>
-        <p:txBody>
-          <a:bodyPr/>
+        <p:spPr>
+          <a:xfrm>
+            <a:off x="457200" y="2779250"/>
+            <a:ext cx="8229600" cy="1143000"/>
+          </a:xfrm>
+        </p:spPr>
+        <p:txBody>
+          <a:bodyPr>
+            <a:normAutofit/>
+          </a:bodyPr>
           <a:lstStyle/>
           <a:p>
             <a:r>
               <a:rPr lang="en-US" dirty="0" smtClean="0"/>
-              <a:t>Controller</a:t>
+              <a:t>	Questions?</a:t>
             </a:r>
             <a:endParaRPr lang="en-US" dirty="0"/>
-          </a:p>
-        </p:txBody>
-      </p:sp>
-      <p:sp>
-        <p:nvSpPr>
-          <p:cNvPr id="3" name="Content Placeholder 2"/>
-          <p:cNvSpPr>
-            <a:spLocks noGrp="1"/>
-          </p:cNvSpPr>
-          <p:nvPr>
-            <p:ph idx="1"/>
-          </p:nvPr>
-        </p:nvSpPr>
-        <p:spPr/>
-        <p:txBody>
-          <a:bodyPr/>
-          <a:lstStyle/>
-          <a:p>
-            <a:r>
-              <a:rPr lang="en-US" dirty="0" smtClean="0"/>
-              <a:t>Supported requests</a:t>
-            </a:r>
-          </a:p>
-          <a:p>
-            <a:pPr lvl="1"/>
-            <a:r>
-              <a:rPr lang="en-US" dirty="0" err="1" smtClean="0"/>
-              <a:t>resetGame</a:t>
-            </a:r>
-            <a:r>
-              <a:rPr lang="en-US" dirty="0" smtClean="0"/>
-              <a:t> </a:t>
-            </a:r>
-            <a:r>
-              <a:rPr lang="mr-IN" dirty="0" smtClean="0"/>
-              <a:t>–</a:t>
-            </a:r>
-            <a:r>
-              <a:rPr lang="en-US" dirty="0" smtClean="0"/>
-              <a:t> get canvas dims and reset game objects </a:t>
-            </a:r>
-          </a:p>
-          <a:p>
-            <a:pPr lvl="1"/>
-            <a:r>
-              <a:rPr lang="en-US" dirty="0" err="1" smtClean="0"/>
-              <a:t>updateGame</a:t>
-            </a:r>
-            <a:r>
-              <a:rPr lang="en-US" dirty="0" smtClean="0"/>
-              <a:t> </a:t>
-            </a:r>
-            <a:r>
-              <a:rPr lang="mr-IN" dirty="0" smtClean="0"/>
-              <a:t>–</a:t>
-            </a:r>
-            <a:r>
-              <a:rPr lang="en-US" dirty="0" smtClean="0"/>
-              <a:t> update game object states</a:t>
-            </a:r>
-          </a:p>
-          <a:p>
-            <a:pPr lvl="1"/>
-            <a:r>
-              <a:rPr lang="en-US" dirty="0" err="1" smtClean="0"/>
-              <a:t>switchDirection</a:t>
-            </a:r>
-            <a:r>
-              <a:rPr lang="en-US" dirty="0" smtClean="0"/>
-              <a:t> </a:t>
-            </a:r>
-            <a:r>
-              <a:rPr lang="mr-IN" dirty="0" smtClean="0"/>
-              <a:t>–</a:t>
-            </a:r>
-            <a:r>
-              <a:rPr lang="en-US" dirty="0" smtClean="0"/>
-              <a:t> switch </a:t>
-            </a:r>
-            <a:r>
-              <a:rPr lang="en-US" dirty="0" err="1" smtClean="0"/>
-              <a:t>Pacman</a:t>
-            </a:r>
-            <a:r>
-              <a:rPr lang="en-US" smtClean="0"/>
-              <a:t> direction</a:t>
-            </a:r>
-            <a:endParaRPr lang="en-US" dirty="0" smtClean="0"/>
           </a:p>
         </p:txBody>
       </p:sp>
     </p:spTree>
     <p:extLst>
       <p:ext uri="{BB962C8B-B14F-4D97-AF65-F5344CB8AC3E}">
-        <p14:creationId xmlns:p14="http://schemas.microsoft.com/office/powerpoint/2010/main" val="1459978361"/>
+        <p14:creationId xmlns:p14="http://schemas.microsoft.com/office/powerpoint/2010/main" val="2591834153"/>
       </p:ext>
     </p:extLst>
   </p:cSld>
   <p:clrMapOvr>
     <a:masterClrMapping/>
   </p:clrMapOvr>
+  <p:timing>
+    <p:tnLst>
+      <p:par>
+        <p:cTn id="1" dur="indefinite" restart="never" nodeType="tmRoot"/>
+      </p:par>
+    </p:tnLst>
+  </p:timing>
 </p:sld>
 </file>
 

</xml_diff>